<commit_message>
Ajout presentation revue 1 colbert
</commit_message>
<xml_diff>
--- a/Ressources/Presentation_Projet_CrossLaPro_E1_Colbert.pptx
+++ b/Ressources/Presentation_Projet_CrossLaPro_E1_Colbert.pptx
@@ -5,7 +5,7 @@
     <p:sldMasterId id="2147483648" r:id="rId1"/>
   </p:sldMasterIdLst>
   <p:notesMasterIdLst>
-    <p:notesMasterId r:id="rId8"/>
+    <p:notesMasterId r:id="rId22"/>
   </p:notesMasterIdLst>
   <p:sldIdLst>
     <p:sldId id="256" r:id="rId2"/>
@@ -14,6 +14,20 @@
     <p:sldId id="259" r:id="rId5"/>
     <p:sldId id="260" r:id="rId6"/>
     <p:sldId id="261" r:id="rId7"/>
+    <p:sldId id="262" r:id="rId8"/>
+    <p:sldId id="263" r:id="rId9"/>
+    <p:sldId id="268" r:id="rId10"/>
+    <p:sldId id="264" r:id="rId11"/>
+    <p:sldId id="265" r:id="rId12"/>
+    <p:sldId id="267" r:id="rId13"/>
+    <p:sldId id="266" r:id="rId14"/>
+    <p:sldId id="269" r:id="rId15"/>
+    <p:sldId id="270" r:id="rId16"/>
+    <p:sldId id="275" r:id="rId17"/>
+    <p:sldId id="273" r:id="rId18"/>
+    <p:sldId id="274" r:id="rId19"/>
+    <p:sldId id="271" r:id="rId20"/>
+    <p:sldId id="272" r:id="rId21"/>
   </p:sldIdLst>
   <p:sldSz cx="12192000" cy="6858000"/>
   <p:notesSz cx="6858000" cy="9144000"/>
@@ -202,7 +216,7 @@
           <a:p>
             <a:fld id="{0A56ADF4-6B32-4AA0-82F6-F5AC1F806832}" type="datetimeFigureOut">
               <a:rPr lang="fr-FR" smtClean="0"/>
-              <a:t>04/05/2021</a:t>
+              <a:t>05/05/2021</a:t>
             </a:fld>
             <a:endParaRPr lang="fr-FR"/>
           </a:p>
@@ -685,7 +699,7 @@
           <a:p>
             <a:fld id="{ED9B9C52-48F3-4333-ACE0-CD005978BCA6}" type="datetimeFigureOut">
               <a:rPr lang="fr-FR" smtClean="0"/>
-              <a:t>04/05/2021</a:t>
+              <a:t>05/05/2021</a:t>
             </a:fld>
             <a:endParaRPr lang="fr-FR"/>
           </a:p>
@@ -855,7 +869,7 @@
           <a:p>
             <a:fld id="{ED9B9C52-48F3-4333-ACE0-CD005978BCA6}" type="datetimeFigureOut">
               <a:rPr lang="fr-FR" smtClean="0"/>
-              <a:t>04/05/2021</a:t>
+              <a:t>05/05/2021</a:t>
             </a:fld>
             <a:endParaRPr lang="fr-FR"/>
           </a:p>
@@ -1035,7 +1049,7 @@
           <a:p>
             <a:fld id="{ED9B9C52-48F3-4333-ACE0-CD005978BCA6}" type="datetimeFigureOut">
               <a:rPr lang="fr-FR" smtClean="0"/>
-              <a:t>04/05/2021</a:t>
+              <a:t>05/05/2021</a:t>
             </a:fld>
             <a:endParaRPr lang="fr-FR"/>
           </a:p>
@@ -1205,7 +1219,7 @@
           <a:p>
             <a:fld id="{ED9B9C52-48F3-4333-ACE0-CD005978BCA6}" type="datetimeFigureOut">
               <a:rPr lang="fr-FR" smtClean="0"/>
-              <a:t>04/05/2021</a:t>
+              <a:t>05/05/2021</a:t>
             </a:fld>
             <a:endParaRPr lang="fr-FR"/>
           </a:p>
@@ -1451,7 +1465,7 @@
           <a:p>
             <a:fld id="{ED9B9C52-48F3-4333-ACE0-CD005978BCA6}" type="datetimeFigureOut">
               <a:rPr lang="fr-FR" smtClean="0"/>
-              <a:t>04/05/2021</a:t>
+              <a:t>05/05/2021</a:t>
             </a:fld>
             <a:endParaRPr lang="fr-FR"/>
           </a:p>
@@ -1683,7 +1697,7 @@
           <a:p>
             <a:fld id="{ED9B9C52-48F3-4333-ACE0-CD005978BCA6}" type="datetimeFigureOut">
               <a:rPr lang="fr-FR" smtClean="0"/>
-              <a:t>04/05/2021</a:t>
+              <a:t>05/05/2021</a:t>
             </a:fld>
             <a:endParaRPr lang="fr-FR"/>
           </a:p>
@@ -2050,7 +2064,7 @@
           <a:p>
             <a:fld id="{ED9B9C52-48F3-4333-ACE0-CD005978BCA6}" type="datetimeFigureOut">
               <a:rPr lang="fr-FR" smtClean="0"/>
-              <a:t>04/05/2021</a:t>
+              <a:t>05/05/2021</a:t>
             </a:fld>
             <a:endParaRPr lang="fr-FR"/>
           </a:p>
@@ -2168,7 +2182,7 @@
           <a:p>
             <a:fld id="{ED9B9C52-48F3-4333-ACE0-CD005978BCA6}" type="datetimeFigureOut">
               <a:rPr lang="fr-FR" smtClean="0"/>
-              <a:t>04/05/2021</a:t>
+              <a:t>05/05/2021</a:t>
             </a:fld>
             <a:endParaRPr lang="fr-FR"/>
           </a:p>
@@ -2263,7 +2277,7 @@
           <a:p>
             <a:fld id="{ED9B9C52-48F3-4333-ACE0-CD005978BCA6}" type="datetimeFigureOut">
               <a:rPr lang="fr-FR" smtClean="0"/>
-              <a:t>04/05/2021</a:t>
+              <a:t>05/05/2021</a:t>
             </a:fld>
             <a:endParaRPr lang="fr-FR"/>
           </a:p>
@@ -2540,7 +2554,7 @@
           <a:p>
             <a:fld id="{ED9B9C52-48F3-4333-ACE0-CD005978BCA6}" type="datetimeFigureOut">
               <a:rPr lang="fr-FR" smtClean="0"/>
-              <a:t>04/05/2021</a:t>
+              <a:t>05/05/2021</a:t>
             </a:fld>
             <a:endParaRPr lang="fr-FR"/>
           </a:p>
@@ -2793,7 +2807,7 @@
           <a:p>
             <a:fld id="{ED9B9C52-48F3-4333-ACE0-CD005978BCA6}" type="datetimeFigureOut">
               <a:rPr lang="fr-FR" smtClean="0"/>
-              <a:t>04/05/2021</a:t>
+              <a:t>05/05/2021</a:t>
             </a:fld>
             <a:endParaRPr lang="fr-FR"/>
           </a:p>
@@ -3006,7 +3020,7 @@
           <a:p>
             <a:fld id="{ED9B9C52-48F3-4333-ACE0-CD005978BCA6}" type="datetimeFigureOut">
               <a:rPr lang="fr-FR" smtClean="0"/>
-              <a:t>04/05/2021</a:t>
+              <a:t>05/05/2021</a:t>
             </a:fld>
             <a:endParaRPr lang="fr-FR"/>
           </a:p>
@@ -3467,7 +3481,7 @@
         </p:nvSpPr>
         <p:spPr>
           <a:xfrm>
-            <a:off x="4493490" y="5246377"/>
+            <a:off x="4263114" y="5574558"/>
             <a:ext cx="3665771" cy="369332"/>
           </a:xfrm>
           <a:prstGeom prst="rect">
@@ -3489,50 +3503,8 @@
                 </a:solidFill>
                 <a:latin typeface="Alone On Earth" pitchFamily="50" charset="0"/>
               </a:rPr>
-              <a:t>Etudiant </a:t>
-            </a:r>
-            <a:r>
-              <a:rPr lang="fr-FR" dirty="0" smtClean="0">
-                <a:solidFill>
-                  <a:schemeClr val="bg1"/>
-                </a:solidFill>
-                <a:latin typeface="Alone On Earth" pitchFamily="50" charset="0"/>
-              </a:rPr>
-              <a:t>1 </a:t>
-            </a:r>
-            <a:r>
-              <a:rPr lang="fr-FR" dirty="0" smtClean="0">
-                <a:solidFill>
-                  <a:schemeClr val="bg1"/>
-                </a:solidFill>
-                <a:latin typeface="Alone On Earth" pitchFamily="50" charset="0"/>
-              </a:rPr>
-              <a:t>: </a:t>
-            </a:r>
-            <a:r>
-              <a:rPr lang="fr-FR" dirty="0" smtClean="0">
-                <a:solidFill>
-                  <a:schemeClr val="bg1"/>
-                </a:solidFill>
-                <a:latin typeface="Alone On Earth" pitchFamily="50" charset="0"/>
-              </a:rPr>
-              <a:t>Grégoire</a:t>
-            </a:r>
-            <a:r>
-              <a:rPr lang="fr-FR" dirty="0" smtClean="0">
-                <a:solidFill>
-                  <a:schemeClr val="bg1"/>
-                </a:solidFill>
-                <a:latin typeface="Alone On Earth" pitchFamily="50" charset="0"/>
-              </a:rPr>
-              <a:t> Colbert</a:t>
-            </a:r>
-            <a:endParaRPr lang="fr-FR" dirty="0" smtClean="0">
-              <a:solidFill>
-                <a:schemeClr val="bg1"/>
-              </a:solidFill>
-              <a:latin typeface="Alone On Earth" pitchFamily="50" charset="0"/>
-            </a:endParaRPr>
+              <a:t>Etudiant 1 : Grégoire Colbert</a:t>
+            </a:r>
           </a:p>
         </p:txBody>
       </p:sp>
@@ -3559,7 +3531,7 @@
         </p:blipFill>
         <p:spPr bwMode="auto">
           <a:xfrm>
-            <a:off x="3109790" y="1348654"/>
+            <a:off x="2992625" y="1556606"/>
             <a:ext cx="6438900" cy="3810000"/>
           </a:xfrm>
           <a:prstGeom prst="rect">
@@ -3581,6 +3553,1980 @@
     <p:extLst>
       <p:ext uri="{BB962C8B-B14F-4D97-AF65-F5344CB8AC3E}">
         <p14:creationId xmlns:p14="http://schemas.microsoft.com/office/powerpoint/2010/main" val="871620520"/>
+      </p:ext>
+    </p:extLst>
+  </p:cSld>
+  <p:clrMapOvr>
+    <a:masterClrMapping/>
+  </p:clrMapOvr>
+  <p:timing>
+    <p:tnLst>
+      <p:par>
+        <p:cTn id="1" dur="indefinite" restart="never" nodeType="tmRoot"/>
+      </p:par>
+    </p:tnLst>
+  </p:timing>
+</p:sld>
+</file>
+
+<file path=ppt/slides/slide10.xml><?xml version="1.0" encoding="utf-8"?>
+<p:sld xmlns:a="http://schemas.openxmlformats.org/drawingml/2006/main" xmlns:r="http://schemas.openxmlformats.org/officeDocument/2006/relationships" xmlns:p="http://schemas.openxmlformats.org/presentationml/2006/main">
+  <p:cSld>
+    <p:bg>
+      <p:bgPr>
+        <a:solidFill>
+          <a:srgbClr val="CC3300"/>
+        </a:solidFill>
+        <a:effectLst/>
+      </p:bgPr>
+    </p:bg>
+    <p:spTree>
+      <p:nvGrpSpPr>
+        <p:cNvPr id="1" name=""/>
+        <p:cNvGrpSpPr/>
+        <p:nvPr/>
+      </p:nvGrpSpPr>
+      <p:grpSpPr>
+        <a:xfrm>
+          <a:off x="0" y="0"/>
+          <a:ext cx="0" cy="0"/>
+          <a:chOff x="0" y="0"/>
+          <a:chExt cx="0" cy="0"/>
+        </a:xfrm>
+      </p:grpSpPr>
+      <p:sp>
+        <p:nvSpPr>
+          <p:cNvPr id="2" name="Titre 1"/>
+          <p:cNvSpPr>
+            <a:spLocks noGrp="1"/>
+          </p:cNvSpPr>
+          <p:nvPr>
+            <p:ph type="ctrTitle"/>
+          </p:nvPr>
+        </p:nvSpPr>
+        <p:spPr>
+          <a:xfrm>
+            <a:off x="1076567" y="733136"/>
+            <a:ext cx="10520393" cy="785236"/>
+          </a:xfrm>
+        </p:spPr>
+        <p:txBody>
+          <a:bodyPr anchor="ctr">
+            <a:normAutofit fontScale="90000"/>
+          </a:bodyPr>
+          <a:lstStyle/>
+          <a:p>
+            <a:r>
+              <a:rPr lang="fr-FR" dirty="0" smtClean="0">
+                <a:solidFill>
+                  <a:schemeClr val="bg1"/>
+                </a:solidFill>
+                <a:latin typeface="Alone On Earth" pitchFamily="50" charset="0"/>
+              </a:rPr>
+              <a:t>Connexion/Inscription au site</a:t>
+            </a:r>
+            <a:endParaRPr lang="fr-FR" dirty="0">
+              <a:solidFill>
+                <a:schemeClr val="bg1"/>
+              </a:solidFill>
+              <a:latin typeface="Alone On Earth" pitchFamily="50" charset="0"/>
+            </a:endParaRPr>
+          </a:p>
+        </p:txBody>
+      </p:sp>
+      <p:sp>
+        <p:nvSpPr>
+          <p:cNvPr id="4" name="ZoneTexte 3"/>
+          <p:cNvSpPr txBox="1"/>
+          <p:nvPr/>
+        </p:nvSpPr>
+        <p:spPr>
+          <a:xfrm>
+            <a:off x="8350898" y="57727"/>
+            <a:ext cx="4187466" cy="369332"/>
+          </a:xfrm>
+          <a:prstGeom prst="rect">
+            <a:avLst/>
+          </a:prstGeom>
+          <a:noFill/>
+        </p:spPr>
+        <p:txBody>
+          <a:bodyPr wrap="square" rtlCol="0">
+            <a:spAutoFit/>
+          </a:bodyPr>
+          <a:lstStyle/>
+          <a:p>
+            <a:pPr algn="ctr"/>
+            <a:r>
+              <a:rPr lang="fr-FR" dirty="0">
+                <a:solidFill>
+                  <a:schemeClr val="bg1"/>
+                </a:solidFill>
+                <a:latin typeface="Alone On Earth" pitchFamily="50" charset="0"/>
+              </a:rPr>
+              <a:t>Etudiant 1 : Grégoire Colbert</a:t>
+            </a:r>
+          </a:p>
+        </p:txBody>
+      </p:sp>
+      <p:pic>
+        <p:nvPicPr>
+          <p:cNvPr id="5" name="Picture 6" descr="http://www.la-providence.net/images/vina_erida/logo_providence.jpg"/>
+          <p:cNvPicPr>
+            <a:picLocks noChangeAspect="1" noChangeArrowheads="1"/>
+          </p:cNvPicPr>
+          <p:nvPr/>
+        </p:nvPicPr>
+        <p:blipFill>
+          <a:blip r:embed="rId2">
+            <a:extLst>
+              <a:ext uri="{28A0092B-C50C-407E-A947-70E740481C1C}">
+                <a14:useLocalDpi xmlns:a14="http://schemas.microsoft.com/office/drawing/2010/main" val="0"/>
+              </a:ext>
+            </a:extLst>
+          </a:blip>
+          <a:srcRect/>
+          <a:stretch>
+            <a:fillRect/>
+          </a:stretch>
+        </p:blipFill>
+        <p:spPr bwMode="auto">
+          <a:xfrm>
+            <a:off x="142251" y="57727"/>
+            <a:ext cx="1868632" cy="565507"/>
+          </a:xfrm>
+          <a:prstGeom prst="rect">
+            <a:avLst/>
+          </a:prstGeom>
+          <a:noFill/>
+          <a:effectLst>
+            <a:outerShdw blurRad="50800" dist="38100" dir="8100000" algn="tr" rotWithShape="0">
+              <a:prstClr val="black">
+                <a:alpha val="40000"/>
+              </a:prstClr>
+            </a:outerShdw>
+          </a:effectLst>
+          <a:extLst>
+            <a:ext uri="{909E8E84-426E-40DD-AFC4-6F175D3DCCD1}">
+              <a14:hiddenFill xmlns:a14="http://schemas.microsoft.com/office/drawing/2010/main">
+                <a:solidFill>
+                  <a:srgbClr val="FFFFFF"/>
+                </a:solidFill>
+              </a14:hiddenFill>
+            </a:ext>
+          </a:extLst>
+        </p:spPr>
+      </p:pic>
+      <p:pic>
+        <p:nvPicPr>
+          <p:cNvPr id="3" name="Image 2"/>
+          <p:cNvPicPr>
+            <a:picLocks noChangeAspect="1"/>
+          </p:cNvPicPr>
+          <p:nvPr/>
+        </p:nvPicPr>
+        <p:blipFill>
+          <a:blip r:embed="rId3">
+            <a:extLst>
+              <a:ext uri="{28A0092B-C50C-407E-A947-70E740481C1C}">
+                <a14:useLocalDpi xmlns:a14="http://schemas.microsoft.com/office/drawing/2010/main" val="0"/>
+              </a:ext>
+            </a:extLst>
+          </a:blip>
+          <a:stretch>
+            <a:fillRect/>
+          </a:stretch>
+        </p:blipFill>
+        <p:spPr>
+          <a:xfrm>
+            <a:off x="3340100" y="2210528"/>
+            <a:ext cx="8681202" cy="4486310"/>
+          </a:xfrm>
+          <a:prstGeom prst="rect">
+            <a:avLst/>
+          </a:prstGeom>
+        </p:spPr>
+      </p:pic>
+      <p:pic>
+        <p:nvPicPr>
+          <p:cNvPr id="6" name="Image 5"/>
+          <p:cNvPicPr>
+            <a:picLocks noChangeAspect="1"/>
+          </p:cNvPicPr>
+          <p:nvPr/>
+        </p:nvPicPr>
+        <p:blipFill>
+          <a:blip r:embed="rId4"/>
+          <a:stretch>
+            <a:fillRect/>
+          </a:stretch>
+        </p:blipFill>
+        <p:spPr>
+          <a:xfrm>
+            <a:off x="404812" y="2022474"/>
+            <a:ext cx="2536770" cy="860425"/>
+          </a:xfrm>
+          <a:prstGeom prst="rect">
+            <a:avLst/>
+          </a:prstGeom>
+        </p:spPr>
+      </p:pic>
+    </p:spTree>
+    <p:extLst>
+      <p:ext uri="{BB962C8B-B14F-4D97-AF65-F5344CB8AC3E}">
+        <p14:creationId xmlns:p14="http://schemas.microsoft.com/office/powerpoint/2010/main" val="3222515693"/>
+      </p:ext>
+    </p:extLst>
+  </p:cSld>
+  <p:clrMapOvr>
+    <a:masterClrMapping/>
+  </p:clrMapOvr>
+  <p:timing>
+    <p:tnLst>
+      <p:par>
+        <p:cTn id="1" dur="indefinite" restart="never" nodeType="tmRoot"/>
+      </p:par>
+    </p:tnLst>
+  </p:timing>
+</p:sld>
+</file>
+
+<file path=ppt/slides/slide11.xml><?xml version="1.0" encoding="utf-8"?>
+<p:sld xmlns:a="http://schemas.openxmlformats.org/drawingml/2006/main" xmlns:r="http://schemas.openxmlformats.org/officeDocument/2006/relationships" xmlns:p="http://schemas.openxmlformats.org/presentationml/2006/main">
+  <p:cSld>
+    <p:bg>
+      <p:bgPr>
+        <a:solidFill>
+          <a:srgbClr val="CC3300"/>
+        </a:solidFill>
+        <a:effectLst/>
+      </p:bgPr>
+    </p:bg>
+    <p:spTree>
+      <p:nvGrpSpPr>
+        <p:cNvPr id="1" name=""/>
+        <p:cNvGrpSpPr/>
+        <p:nvPr/>
+      </p:nvGrpSpPr>
+      <p:grpSpPr>
+        <a:xfrm>
+          <a:off x="0" y="0"/>
+          <a:ext cx="0" cy="0"/>
+          <a:chOff x="0" y="0"/>
+          <a:chExt cx="0" cy="0"/>
+        </a:xfrm>
+      </p:grpSpPr>
+      <p:sp>
+        <p:nvSpPr>
+          <p:cNvPr id="2" name="Titre 1"/>
+          <p:cNvSpPr>
+            <a:spLocks noGrp="1"/>
+          </p:cNvSpPr>
+          <p:nvPr>
+            <p:ph type="ctrTitle"/>
+          </p:nvPr>
+        </p:nvSpPr>
+        <p:spPr>
+          <a:xfrm>
+            <a:off x="1500909" y="568036"/>
+            <a:ext cx="9144000" cy="785236"/>
+          </a:xfrm>
+        </p:spPr>
+        <p:txBody>
+          <a:bodyPr anchor="ctr">
+            <a:normAutofit fontScale="90000"/>
+          </a:bodyPr>
+          <a:lstStyle/>
+          <a:p>
+            <a:r>
+              <a:rPr lang="fr-FR" dirty="0" smtClean="0">
+                <a:solidFill>
+                  <a:schemeClr val="bg1"/>
+                </a:solidFill>
+                <a:latin typeface="Alone On Earth" pitchFamily="50" charset="0"/>
+              </a:rPr>
+              <a:t>Création d’une Course</a:t>
+            </a:r>
+            <a:endParaRPr lang="fr-FR" dirty="0">
+              <a:solidFill>
+                <a:schemeClr val="bg1"/>
+              </a:solidFill>
+              <a:latin typeface="Alone On Earth" pitchFamily="50" charset="0"/>
+            </a:endParaRPr>
+          </a:p>
+        </p:txBody>
+      </p:sp>
+      <p:sp>
+        <p:nvSpPr>
+          <p:cNvPr id="4" name="ZoneTexte 3"/>
+          <p:cNvSpPr txBox="1"/>
+          <p:nvPr/>
+        </p:nvSpPr>
+        <p:spPr>
+          <a:xfrm>
+            <a:off x="8350898" y="57727"/>
+            <a:ext cx="4187466" cy="369332"/>
+          </a:xfrm>
+          <a:prstGeom prst="rect">
+            <a:avLst/>
+          </a:prstGeom>
+          <a:noFill/>
+        </p:spPr>
+        <p:txBody>
+          <a:bodyPr wrap="square" rtlCol="0">
+            <a:spAutoFit/>
+          </a:bodyPr>
+          <a:lstStyle/>
+          <a:p>
+            <a:pPr algn="ctr"/>
+            <a:r>
+              <a:rPr lang="fr-FR" dirty="0">
+                <a:solidFill>
+                  <a:schemeClr val="bg1"/>
+                </a:solidFill>
+                <a:latin typeface="Alone On Earth" pitchFamily="50" charset="0"/>
+              </a:rPr>
+              <a:t>Etudiant 1 : Grégoire Colbert</a:t>
+            </a:r>
+          </a:p>
+        </p:txBody>
+      </p:sp>
+      <p:pic>
+        <p:nvPicPr>
+          <p:cNvPr id="5" name="Picture 6" descr="http://www.la-providence.net/images/vina_erida/logo_providence.jpg"/>
+          <p:cNvPicPr>
+            <a:picLocks noChangeAspect="1" noChangeArrowheads="1"/>
+          </p:cNvPicPr>
+          <p:nvPr/>
+        </p:nvPicPr>
+        <p:blipFill>
+          <a:blip r:embed="rId2">
+            <a:extLst>
+              <a:ext uri="{28A0092B-C50C-407E-A947-70E740481C1C}">
+                <a14:useLocalDpi xmlns:a14="http://schemas.microsoft.com/office/drawing/2010/main" val="0"/>
+              </a:ext>
+            </a:extLst>
+          </a:blip>
+          <a:srcRect/>
+          <a:stretch>
+            <a:fillRect/>
+          </a:stretch>
+        </p:blipFill>
+        <p:spPr bwMode="auto">
+          <a:xfrm>
+            <a:off x="142251" y="57727"/>
+            <a:ext cx="1868632" cy="565507"/>
+          </a:xfrm>
+          <a:prstGeom prst="rect">
+            <a:avLst/>
+          </a:prstGeom>
+          <a:noFill/>
+          <a:effectLst>
+            <a:outerShdw blurRad="50800" dist="38100" dir="8100000" algn="tr" rotWithShape="0">
+              <a:prstClr val="black">
+                <a:alpha val="40000"/>
+              </a:prstClr>
+            </a:outerShdw>
+          </a:effectLst>
+          <a:extLst>
+            <a:ext uri="{909E8E84-426E-40DD-AFC4-6F175D3DCCD1}">
+              <a14:hiddenFill xmlns:a14="http://schemas.microsoft.com/office/drawing/2010/main">
+                <a:solidFill>
+                  <a:srgbClr val="FFFFFF"/>
+                </a:solidFill>
+              </a14:hiddenFill>
+            </a:ext>
+          </a:extLst>
+        </p:spPr>
+      </p:pic>
+      <p:pic>
+        <p:nvPicPr>
+          <p:cNvPr id="3" name="Image 2"/>
+          <p:cNvPicPr>
+            <a:picLocks noChangeAspect="1"/>
+          </p:cNvPicPr>
+          <p:nvPr/>
+        </p:nvPicPr>
+        <p:blipFill>
+          <a:blip r:embed="rId3">
+            <a:extLst>
+              <a:ext uri="{28A0092B-C50C-407E-A947-70E740481C1C}">
+                <a14:useLocalDpi xmlns:a14="http://schemas.microsoft.com/office/drawing/2010/main" val="0"/>
+              </a:ext>
+            </a:extLst>
+          </a:blip>
+          <a:stretch>
+            <a:fillRect/>
+          </a:stretch>
+        </p:blipFill>
+        <p:spPr>
+          <a:xfrm>
+            <a:off x="1756024" y="2743200"/>
+            <a:ext cx="10308976" cy="3977483"/>
+          </a:xfrm>
+          <a:prstGeom prst="rect">
+            <a:avLst/>
+          </a:prstGeom>
+        </p:spPr>
+      </p:pic>
+      <p:pic>
+        <p:nvPicPr>
+          <p:cNvPr id="7" name="Image 6"/>
+          <p:cNvPicPr>
+            <a:picLocks noChangeAspect="1"/>
+          </p:cNvPicPr>
+          <p:nvPr/>
+        </p:nvPicPr>
+        <p:blipFill>
+          <a:blip r:embed="rId4"/>
+          <a:stretch>
+            <a:fillRect/>
+          </a:stretch>
+        </p:blipFill>
+        <p:spPr>
+          <a:xfrm>
+            <a:off x="403474" y="1615931"/>
+            <a:ext cx="2276226" cy="833548"/>
+          </a:xfrm>
+          <a:prstGeom prst="rect">
+            <a:avLst/>
+          </a:prstGeom>
+        </p:spPr>
+      </p:pic>
+    </p:spTree>
+    <p:extLst>
+      <p:ext uri="{BB962C8B-B14F-4D97-AF65-F5344CB8AC3E}">
+        <p14:creationId xmlns:p14="http://schemas.microsoft.com/office/powerpoint/2010/main" val="716326965"/>
+      </p:ext>
+    </p:extLst>
+  </p:cSld>
+  <p:clrMapOvr>
+    <a:masterClrMapping/>
+  </p:clrMapOvr>
+  <p:timing>
+    <p:tnLst>
+      <p:par>
+        <p:cTn id="1" dur="indefinite" restart="never" nodeType="tmRoot"/>
+      </p:par>
+    </p:tnLst>
+  </p:timing>
+</p:sld>
+</file>
+
+<file path=ppt/slides/slide12.xml><?xml version="1.0" encoding="utf-8"?>
+<p:sld xmlns:a="http://schemas.openxmlformats.org/drawingml/2006/main" xmlns:r="http://schemas.openxmlformats.org/officeDocument/2006/relationships" xmlns:p="http://schemas.openxmlformats.org/presentationml/2006/main">
+  <p:cSld>
+    <p:bg>
+      <p:bgPr>
+        <a:solidFill>
+          <a:srgbClr val="CC3300"/>
+        </a:solidFill>
+        <a:effectLst/>
+      </p:bgPr>
+    </p:bg>
+    <p:spTree>
+      <p:nvGrpSpPr>
+        <p:cNvPr id="1" name=""/>
+        <p:cNvGrpSpPr/>
+        <p:nvPr/>
+      </p:nvGrpSpPr>
+      <p:grpSpPr>
+        <a:xfrm>
+          <a:off x="0" y="0"/>
+          <a:ext cx="0" cy="0"/>
+          <a:chOff x="0" y="0"/>
+          <a:chExt cx="0" cy="0"/>
+        </a:xfrm>
+      </p:grpSpPr>
+      <p:sp>
+        <p:nvSpPr>
+          <p:cNvPr id="2" name="Titre 1"/>
+          <p:cNvSpPr>
+            <a:spLocks noGrp="1"/>
+          </p:cNvSpPr>
+          <p:nvPr>
+            <p:ph type="ctrTitle"/>
+          </p:nvPr>
+        </p:nvSpPr>
+        <p:spPr>
+          <a:xfrm>
+            <a:off x="1500909" y="568036"/>
+            <a:ext cx="9144000" cy="785236"/>
+          </a:xfrm>
+        </p:spPr>
+        <p:txBody>
+          <a:bodyPr anchor="ctr">
+            <a:normAutofit fontScale="90000"/>
+          </a:bodyPr>
+          <a:lstStyle/>
+          <a:p>
+            <a:r>
+              <a:rPr lang="fr-FR" dirty="0" smtClean="0">
+                <a:solidFill>
+                  <a:schemeClr val="bg1"/>
+                </a:solidFill>
+                <a:latin typeface="Alone On Earth" pitchFamily="50" charset="0"/>
+              </a:rPr>
+              <a:t>Inscription à une course</a:t>
+            </a:r>
+            <a:endParaRPr lang="fr-FR" dirty="0">
+              <a:solidFill>
+                <a:schemeClr val="bg1"/>
+              </a:solidFill>
+              <a:latin typeface="Alone On Earth" pitchFamily="50" charset="0"/>
+            </a:endParaRPr>
+          </a:p>
+        </p:txBody>
+      </p:sp>
+      <p:sp>
+        <p:nvSpPr>
+          <p:cNvPr id="4" name="ZoneTexte 3"/>
+          <p:cNvSpPr txBox="1"/>
+          <p:nvPr/>
+        </p:nvSpPr>
+        <p:spPr>
+          <a:xfrm>
+            <a:off x="8350898" y="57727"/>
+            <a:ext cx="4187466" cy="369332"/>
+          </a:xfrm>
+          <a:prstGeom prst="rect">
+            <a:avLst/>
+          </a:prstGeom>
+          <a:noFill/>
+        </p:spPr>
+        <p:txBody>
+          <a:bodyPr wrap="square" rtlCol="0">
+            <a:spAutoFit/>
+          </a:bodyPr>
+          <a:lstStyle/>
+          <a:p>
+            <a:pPr algn="ctr"/>
+            <a:r>
+              <a:rPr lang="fr-FR" dirty="0">
+                <a:solidFill>
+                  <a:schemeClr val="bg1"/>
+                </a:solidFill>
+                <a:latin typeface="Alone On Earth" pitchFamily="50" charset="0"/>
+              </a:rPr>
+              <a:t>Etudiant 1 : Grégoire Colbert</a:t>
+            </a:r>
+          </a:p>
+        </p:txBody>
+      </p:sp>
+      <p:pic>
+        <p:nvPicPr>
+          <p:cNvPr id="5" name="Picture 6" descr="http://www.la-providence.net/images/vina_erida/logo_providence.jpg"/>
+          <p:cNvPicPr>
+            <a:picLocks noChangeAspect="1" noChangeArrowheads="1"/>
+          </p:cNvPicPr>
+          <p:nvPr/>
+        </p:nvPicPr>
+        <p:blipFill>
+          <a:blip r:embed="rId2">
+            <a:extLst>
+              <a:ext uri="{28A0092B-C50C-407E-A947-70E740481C1C}">
+                <a14:useLocalDpi xmlns:a14="http://schemas.microsoft.com/office/drawing/2010/main" val="0"/>
+              </a:ext>
+            </a:extLst>
+          </a:blip>
+          <a:srcRect/>
+          <a:stretch>
+            <a:fillRect/>
+          </a:stretch>
+        </p:blipFill>
+        <p:spPr bwMode="auto">
+          <a:xfrm>
+            <a:off x="142251" y="57727"/>
+            <a:ext cx="1868632" cy="565507"/>
+          </a:xfrm>
+          <a:prstGeom prst="rect">
+            <a:avLst/>
+          </a:prstGeom>
+          <a:noFill/>
+          <a:effectLst>
+            <a:outerShdw blurRad="50800" dist="38100" dir="8100000" algn="tr" rotWithShape="0">
+              <a:prstClr val="black">
+                <a:alpha val="40000"/>
+              </a:prstClr>
+            </a:outerShdw>
+          </a:effectLst>
+          <a:extLst>
+            <a:ext uri="{909E8E84-426E-40DD-AFC4-6F175D3DCCD1}">
+              <a14:hiddenFill xmlns:a14="http://schemas.microsoft.com/office/drawing/2010/main">
+                <a:solidFill>
+                  <a:srgbClr val="FFFFFF"/>
+                </a:solidFill>
+              </a14:hiddenFill>
+            </a:ext>
+          </a:extLst>
+        </p:spPr>
+      </p:pic>
+      <p:pic>
+        <p:nvPicPr>
+          <p:cNvPr id="3" name="Image 2"/>
+          <p:cNvPicPr>
+            <a:picLocks noChangeAspect="1"/>
+          </p:cNvPicPr>
+          <p:nvPr/>
+        </p:nvPicPr>
+        <p:blipFill>
+          <a:blip r:embed="rId3">
+            <a:extLst>
+              <a:ext uri="{28A0092B-C50C-407E-A947-70E740481C1C}">
+                <a14:useLocalDpi xmlns:a14="http://schemas.microsoft.com/office/drawing/2010/main" val="0"/>
+              </a:ext>
+            </a:extLst>
+          </a:blip>
+          <a:stretch>
+            <a:fillRect/>
+          </a:stretch>
+        </p:blipFill>
+        <p:spPr>
+          <a:xfrm>
+            <a:off x="1871183" y="2361423"/>
+            <a:ext cx="10181117" cy="4369578"/>
+          </a:xfrm>
+          <a:prstGeom prst="rect">
+            <a:avLst/>
+          </a:prstGeom>
+        </p:spPr>
+      </p:pic>
+      <p:pic>
+        <p:nvPicPr>
+          <p:cNvPr id="6" name="Image 5"/>
+          <p:cNvPicPr>
+            <a:picLocks noChangeAspect="1"/>
+          </p:cNvPicPr>
+          <p:nvPr/>
+        </p:nvPicPr>
+        <p:blipFill>
+          <a:blip r:embed="rId4"/>
+          <a:stretch>
+            <a:fillRect/>
+          </a:stretch>
+        </p:blipFill>
+        <p:spPr>
+          <a:xfrm>
+            <a:off x="197334" y="1509885"/>
+            <a:ext cx="2540180" cy="707392"/>
+          </a:xfrm>
+          <a:prstGeom prst="rect">
+            <a:avLst/>
+          </a:prstGeom>
+        </p:spPr>
+      </p:pic>
+    </p:spTree>
+    <p:extLst>
+      <p:ext uri="{BB962C8B-B14F-4D97-AF65-F5344CB8AC3E}">
+        <p14:creationId xmlns:p14="http://schemas.microsoft.com/office/powerpoint/2010/main" val="1811172626"/>
+      </p:ext>
+    </p:extLst>
+  </p:cSld>
+  <p:clrMapOvr>
+    <a:masterClrMapping/>
+  </p:clrMapOvr>
+  <p:timing>
+    <p:tnLst>
+      <p:par>
+        <p:cTn id="1" dur="indefinite" restart="never" nodeType="tmRoot"/>
+      </p:par>
+    </p:tnLst>
+  </p:timing>
+</p:sld>
+</file>
+
+<file path=ppt/slides/slide13.xml><?xml version="1.0" encoding="utf-8"?>
+<p:sld xmlns:a="http://schemas.openxmlformats.org/drawingml/2006/main" xmlns:r="http://schemas.openxmlformats.org/officeDocument/2006/relationships" xmlns:p="http://schemas.openxmlformats.org/presentationml/2006/main">
+  <p:cSld>
+    <p:bg>
+      <p:bgPr>
+        <a:solidFill>
+          <a:srgbClr val="CC3300"/>
+        </a:solidFill>
+        <a:effectLst/>
+      </p:bgPr>
+    </p:bg>
+    <p:spTree>
+      <p:nvGrpSpPr>
+        <p:cNvPr id="1" name=""/>
+        <p:cNvGrpSpPr/>
+        <p:nvPr/>
+      </p:nvGrpSpPr>
+      <p:grpSpPr>
+        <a:xfrm>
+          <a:off x="0" y="0"/>
+          <a:ext cx="0" cy="0"/>
+          <a:chOff x="0" y="0"/>
+          <a:chExt cx="0" cy="0"/>
+        </a:xfrm>
+      </p:grpSpPr>
+      <p:sp>
+        <p:nvSpPr>
+          <p:cNvPr id="2" name="Titre 1"/>
+          <p:cNvSpPr>
+            <a:spLocks noGrp="1"/>
+          </p:cNvSpPr>
+          <p:nvPr>
+            <p:ph type="ctrTitle"/>
+          </p:nvPr>
+        </p:nvSpPr>
+        <p:spPr>
+          <a:xfrm>
+            <a:off x="1500909" y="568036"/>
+            <a:ext cx="9144000" cy="785236"/>
+          </a:xfrm>
+        </p:spPr>
+        <p:txBody>
+          <a:bodyPr anchor="ctr">
+            <a:normAutofit fontScale="90000"/>
+          </a:bodyPr>
+          <a:lstStyle/>
+          <a:p>
+            <a:r>
+              <a:rPr lang="fr-FR" dirty="0" smtClean="0">
+                <a:solidFill>
+                  <a:schemeClr val="bg1"/>
+                </a:solidFill>
+                <a:latin typeface="Alone On Earth" pitchFamily="50" charset="0"/>
+              </a:rPr>
+              <a:t>Gérer la course</a:t>
+            </a:r>
+            <a:endParaRPr lang="fr-FR" dirty="0">
+              <a:solidFill>
+                <a:schemeClr val="bg1"/>
+              </a:solidFill>
+              <a:latin typeface="Alone On Earth" pitchFamily="50" charset="0"/>
+            </a:endParaRPr>
+          </a:p>
+        </p:txBody>
+      </p:sp>
+      <p:sp>
+        <p:nvSpPr>
+          <p:cNvPr id="4" name="ZoneTexte 3"/>
+          <p:cNvSpPr txBox="1"/>
+          <p:nvPr/>
+        </p:nvSpPr>
+        <p:spPr>
+          <a:xfrm>
+            <a:off x="8350898" y="57727"/>
+            <a:ext cx="4187466" cy="369332"/>
+          </a:xfrm>
+          <a:prstGeom prst="rect">
+            <a:avLst/>
+          </a:prstGeom>
+          <a:noFill/>
+        </p:spPr>
+        <p:txBody>
+          <a:bodyPr wrap="square" rtlCol="0">
+            <a:spAutoFit/>
+          </a:bodyPr>
+          <a:lstStyle/>
+          <a:p>
+            <a:pPr algn="ctr"/>
+            <a:r>
+              <a:rPr lang="fr-FR" dirty="0">
+                <a:solidFill>
+                  <a:schemeClr val="bg1"/>
+                </a:solidFill>
+                <a:latin typeface="Alone On Earth" pitchFamily="50" charset="0"/>
+              </a:rPr>
+              <a:t>Etudiant 1 : Grégoire Colbert</a:t>
+            </a:r>
+          </a:p>
+        </p:txBody>
+      </p:sp>
+      <p:pic>
+        <p:nvPicPr>
+          <p:cNvPr id="5" name="Picture 6" descr="http://www.la-providence.net/images/vina_erida/logo_providence.jpg"/>
+          <p:cNvPicPr>
+            <a:picLocks noChangeAspect="1" noChangeArrowheads="1"/>
+          </p:cNvPicPr>
+          <p:nvPr/>
+        </p:nvPicPr>
+        <p:blipFill>
+          <a:blip r:embed="rId2">
+            <a:extLst>
+              <a:ext uri="{28A0092B-C50C-407E-A947-70E740481C1C}">
+                <a14:useLocalDpi xmlns:a14="http://schemas.microsoft.com/office/drawing/2010/main" val="0"/>
+              </a:ext>
+            </a:extLst>
+          </a:blip>
+          <a:srcRect/>
+          <a:stretch>
+            <a:fillRect/>
+          </a:stretch>
+        </p:blipFill>
+        <p:spPr bwMode="auto">
+          <a:xfrm>
+            <a:off x="142251" y="57727"/>
+            <a:ext cx="1868632" cy="565507"/>
+          </a:xfrm>
+          <a:prstGeom prst="rect">
+            <a:avLst/>
+          </a:prstGeom>
+          <a:noFill/>
+          <a:effectLst>
+            <a:outerShdw blurRad="50800" dist="38100" dir="8100000" algn="tr" rotWithShape="0">
+              <a:prstClr val="black">
+                <a:alpha val="40000"/>
+              </a:prstClr>
+            </a:outerShdw>
+          </a:effectLst>
+          <a:extLst>
+            <a:ext uri="{909E8E84-426E-40DD-AFC4-6F175D3DCCD1}">
+              <a14:hiddenFill xmlns:a14="http://schemas.microsoft.com/office/drawing/2010/main">
+                <a:solidFill>
+                  <a:srgbClr val="FFFFFF"/>
+                </a:solidFill>
+              </a14:hiddenFill>
+            </a:ext>
+          </a:extLst>
+        </p:spPr>
+      </p:pic>
+      <p:pic>
+        <p:nvPicPr>
+          <p:cNvPr id="6" name="Image 5"/>
+          <p:cNvPicPr>
+            <a:picLocks noChangeAspect="1"/>
+          </p:cNvPicPr>
+          <p:nvPr/>
+        </p:nvPicPr>
+        <p:blipFill>
+          <a:blip r:embed="rId3">
+            <a:extLst>
+              <a:ext uri="{28A0092B-C50C-407E-A947-70E740481C1C}">
+                <a14:useLocalDpi xmlns:a14="http://schemas.microsoft.com/office/drawing/2010/main" val="0"/>
+              </a:ext>
+            </a:extLst>
+          </a:blip>
+          <a:stretch>
+            <a:fillRect/>
+          </a:stretch>
+        </p:blipFill>
+        <p:spPr>
+          <a:xfrm>
+            <a:off x="2489398" y="2232959"/>
+            <a:ext cx="9588301" cy="4498041"/>
+          </a:xfrm>
+          <a:prstGeom prst="rect">
+            <a:avLst/>
+          </a:prstGeom>
+        </p:spPr>
+      </p:pic>
+      <p:pic>
+        <p:nvPicPr>
+          <p:cNvPr id="7" name="Image 6"/>
+          <p:cNvPicPr>
+            <a:picLocks noChangeAspect="1"/>
+          </p:cNvPicPr>
+          <p:nvPr/>
+        </p:nvPicPr>
+        <p:blipFill>
+          <a:blip r:embed="rId4"/>
+          <a:stretch>
+            <a:fillRect/>
+          </a:stretch>
+        </p:blipFill>
+        <p:spPr>
+          <a:xfrm>
+            <a:off x="245583" y="1238972"/>
+            <a:ext cx="2136838" cy="1809028"/>
+          </a:xfrm>
+          <a:prstGeom prst="rect">
+            <a:avLst/>
+          </a:prstGeom>
+        </p:spPr>
+      </p:pic>
+    </p:spTree>
+    <p:extLst>
+      <p:ext uri="{BB962C8B-B14F-4D97-AF65-F5344CB8AC3E}">
+        <p14:creationId xmlns:p14="http://schemas.microsoft.com/office/powerpoint/2010/main" val="1723884444"/>
+      </p:ext>
+    </p:extLst>
+  </p:cSld>
+  <p:clrMapOvr>
+    <a:masterClrMapping/>
+  </p:clrMapOvr>
+  <p:timing>
+    <p:tnLst>
+      <p:par>
+        <p:cTn id="1" dur="indefinite" restart="never" nodeType="tmRoot"/>
+      </p:par>
+    </p:tnLst>
+  </p:timing>
+</p:sld>
+</file>
+
+<file path=ppt/slides/slide14.xml><?xml version="1.0" encoding="utf-8"?>
+<p:sld xmlns:a="http://schemas.openxmlformats.org/drawingml/2006/main" xmlns:r="http://schemas.openxmlformats.org/officeDocument/2006/relationships" xmlns:p="http://schemas.openxmlformats.org/presentationml/2006/main">
+  <p:cSld>
+    <p:bg>
+      <p:bgPr>
+        <a:solidFill>
+          <a:srgbClr val="CC3300"/>
+        </a:solidFill>
+        <a:effectLst/>
+      </p:bgPr>
+    </p:bg>
+    <p:spTree>
+      <p:nvGrpSpPr>
+        <p:cNvPr id="1" name=""/>
+        <p:cNvGrpSpPr/>
+        <p:nvPr/>
+      </p:nvGrpSpPr>
+      <p:grpSpPr>
+        <a:xfrm>
+          <a:off x="0" y="0"/>
+          <a:ext cx="0" cy="0"/>
+          <a:chOff x="0" y="0"/>
+          <a:chExt cx="0" cy="0"/>
+        </a:xfrm>
+      </p:grpSpPr>
+      <p:sp>
+        <p:nvSpPr>
+          <p:cNvPr id="2" name="Titre 1"/>
+          <p:cNvSpPr>
+            <a:spLocks noGrp="1"/>
+          </p:cNvSpPr>
+          <p:nvPr>
+            <p:ph type="ctrTitle"/>
+          </p:nvPr>
+        </p:nvSpPr>
+        <p:spPr>
+          <a:xfrm>
+            <a:off x="1076567" y="662268"/>
+            <a:ext cx="10462491" cy="785236"/>
+          </a:xfrm>
+        </p:spPr>
+        <p:txBody>
+          <a:bodyPr anchor="ctr">
+            <a:normAutofit fontScale="90000"/>
+          </a:bodyPr>
+          <a:lstStyle/>
+          <a:p>
+            <a:r>
+              <a:rPr lang="fr-FR" dirty="0" smtClean="0">
+                <a:solidFill>
+                  <a:schemeClr val="bg1"/>
+                </a:solidFill>
+                <a:latin typeface="Alone On Earth" pitchFamily="50" charset="0"/>
+              </a:rPr>
+              <a:t>Association Coureur Dossard</a:t>
+            </a:r>
+            <a:endParaRPr lang="fr-FR" dirty="0">
+              <a:solidFill>
+                <a:schemeClr val="bg1"/>
+              </a:solidFill>
+              <a:latin typeface="Alone On Earth" pitchFamily="50" charset="0"/>
+            </a:endParaRPr>
+          </a:p>
+        </p:txBody>
+      </p:sp>
+      <p:sp>
+        <p:nvSpPr>
+          <p:cNvPr id="4" name="ZoneTexte 3"/>
+          <p:cNvSpPr txBox="1"/>
+          <p:nvPr/>
+        </p:nvSpPr>
+        <p:spPr>
+          <a:xfrm>
+            <a:off x="8350898" y="57727"/>
+            <a:ext cx="4187466" cy="369332"/>
+          </a:xfrm>
+          <a:prstGeom prst="rect">
+            <a:avLst/>
+          </a:prstGeom>
+          <a:noFill/>
+        </p:spPr>
+        <p:txBody>
+          <a:bodyPr wrap="square" rtlCol="0">
+            <a:spAutoFit/>
+          </a:bodyPr>
+          <a:lstStyle/>
+          <a:p>
+            <a:pPr algn="ctr"/>
+            <a:r>
+              <a:rPr lang="fr-FR" dirty="0">
+                <a:solidFill>
+                  <a:schemeClr val="bg1"/>
+                </a:solidFill>
+                <a:latin typeface="Alone On Earth" pitchFamily="50" charset="0"/>
+              </a:rPr>
+              <a:t>Etudiant 1 : Grégoire Colbert</a:t>
+            </a:r>
+          </a:p>
+        </p:txBody>
+      </p:sp>
+      <p:pic>
+        <p:nvPicPr>
+          <p:cNvPr id="5" name="Picture 6" descr="http://www.la-providence.net/images/vina_erida/logo_providence.jpg"/>
+          <p:cNvPicPr>
+            <a:picLocks noChangeAspect="1" noChangeArrowheads="1"/>
+          </p:cNvPicPr>
+          <p:nvPr/>
+        </p:nvPicPr>
+        <p:blipFill>
+          <a:blip r:embed="rId2">
+            <a:extLst>
+              <a:ext uri="{28A0092B-C50C-407E-A947-70E740481C1C}">
+                <a14:useLocalDpi xmlns:a14="http://schemas.microsoft.com/office/drawing/2010/main" val="0"/>
+              </a:ext>
+            </a:extLst>
+          </a:blip>
+          <a:srcRect/>
+          <a:stretch>
+            <a:fillRect/>
+          </a:stretch>
+        </p:blipFill>
+        <p:spPr bwMode="auto">
+          <a:xfrm>
+            <a:off x="142251" y="57727"/>
+            <a:ext cx="1868632" cy="565507"/>
+          </a:xfrm>
+          <a:prstGeom prst="rect">
+            <a:avLst/>
+          </a:prstGeom>
+          <a:noFill/>
+          <a:effectLst>
+            <a:outerShdw blurRad="50800" dist="38100" dir="8100000" algn="tr" rotWithShape="0">
+              <a:prstClr val="black">
+                <a:alpha val="40000"/>
+              </a:prstClr>
+            </a:outerShdw>
+          </a:effectLst>
+          <a:extLst>
+            <a:ext uri="{909E8E84-426E-40DD-AFC4-6F175D3DCCD1}">
+              <a14:hiddenFill xmlns:a14="http://schemas.microsoft.com/office/drawing/2010/main">
+                <a:solidFill>
+                  <a:srgbClr val="FFFFFF"/>
+                </a:solidFill>
+              </a14:hiddenFill>
+            </a:ext>
+          </a:extLst>
+        </p:spPr>
+      </p:pic>
+      <p:pic>
+        <p:nvPicPr>
+          <p:cNvPr id="3" name="Image 2"/>
+          <p:cNvPicPr>
+            <a:picLocks noChangeAspect="1"/>
+          </p:cNvPicPr>
+          <p:nvPr/>
+        </p:nvPicPr>
+        <p:blipFill>
+          <a:blip r:embed="rId3">
+            <a:extLst>
+              <a:ext uri="{28A0092B-C50C-407E-A947-70E740481C1C}">
+                <a14:useLocalDpi xmlns:a14="http://schemas.microsoft.com/office/drawing/2010/main" val="0"/>
+              </a:ext>
+            </a:extLst>
+          </a:blip>
+          <a:stretch>
+            <a:fillRect/>
+          </a:stretch>
+        </p:blipFill>
+        <p:spPr>
+          <a:xfrm>
+            <a:off x="3515732" y="2285607"/>
+            <a:ext cx="8450023" cy="4331094"/>
+          </a:xfrm>
+          <a:prstGeom prst="rect">
+            <a:avLst/>
+          </a:prstGeom>
+        </p:spPr>
+      </p:pic>
+      <p:pic>
+        <p:nvPicPr>
+          <p:cNvPr id="6" name="Image 5"/>
+          <p:cNvPicPr>
+            <a:picLocks noChangeAspect="1"/>
+          </p:cNvPicPr>
+          <p:nvPr/>
+        </p:nvPicPr>
+        <p:blipFill>
+          <a:blip r:embed="rId4"/>
+          <a:stretch>
+            <a:fillRect/>
+          </a:stretch>
+        </p:blipFill>
+        <p:spPr>
+          <a:xfrm>
+            <a:off x="268287" y="2025649"/>
+            <a:ext cx="2792413" cy="710209"/>
+          </a:xfrm>
+          <a:prstGeom prst="rect">
+            <a:avLst/>
+          </a:prstGeom>
+        </p:spPr>
+      </p:pic>
+    </p:spTree>
+    <p:extLst>
+      <p:ext uri="{BB962C8B-B14F-4D97-AF65-F5344CB8AC3E}">
+        <p14:creationId xmlns:p14="http://schemas.microsoft.com/office/powerpoint/2010/main" val="2971286281"/>
+      </p:ext>
+    </p:extLst>
+  </p:cSld>
+  <p:clrMapOvr>
+    <a:masterClrMapping/>
+  </p:clrMapOvr>
+  <p:timing>
+    <p:tnLst>
+      <p:par>
+        <p:cTn id="1" dur="indefinite" restart="never" nodeType="tmRoot"/>
+      </p:par>
+    </p:tnLst>
+  </p:timing>
+</p:sld>
+</file>
+
+<file path=ppt/slides/slide15.xml><?xml version="1.0" encoding="utf-8"?>
+<p:sld xmlns:a="http://schemas.openxmlformats.org/drawingml/2006/main" xmlns:r="http://schemas.openxmlformats.org/officeDocument/2006/relationships" xmlns:p="http://schemas.openxmlformats.org/presentationml/2006/main">
+  <p:cSld>
+    <p:bg>
+      <p:bgPr>
+        <a:solidFill>
+          <a:srgbClr val="CC3300"/>
+        </a:solidFill>
+        <a:effectLst/>
+      </p:bgPr>
+    </p:bg>
+    <p:spTree>
+      <p:nvGrpSpPr>
+        <p:cNvPr id="1" name=""/>
+        <p:cNvGrpSpPr/>
+        <p:nvPr/>
+      </p:nvGrpSpPr>
+      <p:grpSpPr>
+        <a:xfrm>
+          <a:off x="0" y="0"/>
+          <a:ext cx="0" cy="0"/>
+          <a:chOff x="0" y="0"/>
+          <a:chExt cx="0" cy="0"/>
+        </a:xfrm>
+      </p:grpSpPr>
+      <p:sp>
+        <p:nvSpPr>
+          <p:cNvPr id="2" name="Titre 1"/>
+          <p:cNvSpPr>
+            <a:spLocks noGrp="1"/>
+          </p:cNvSpPr>
+          <p:nvPr>
+            <p:ph type="ctrTitle"/>
+          </p:nvPr>
+        </p:nvSpPr>
+        <p:spPr>
+          <a:xfrm>
+            <a:off x="1500909" y="568036"/>
+            <a:ext cx="9144000" cy="785236"/>
+          </a:xfrm>
+        </p:spPr>
+        <p:txBody>
+          <a:bodyPr anchor="ctr">
+            <a:normAutofit fontScale="90000"/>
+          </a:bodyPr>
+          <a:lstStyle/>
+          <a:p>
+            <a:r>
+              <a:rPr lang="fr-FR" dirty="0" smtClean="0">
+                <a:solidFill>
+                  <a:schemeClr val="bg1"/>
+                </a:solidFill>
+                <a:latin typeface="Alone On Earth" pitchFamily="50" charset="0"/>
+              </a:rPr>
+              <a:t>Distance d’un tour</a:t>
+            </a:r>
+            <a:endParaRPr lang="fr-FR" dirty="0">
+              <a:solidFill>
+                <a:schemeClr val="bg1"/>
+              </a:solidFill>
+              <a:latin typeface="Alone On Earth" pitchFamily="50" charset="0"/>
+            </a:endParaRPr>
+          </a:p>
+        </p:txBody>
+      </p:sp>
+      <p:sp>
+        <p:nvSpPr>
+          <p:cNvPr id="4" name="ZoneTexte 3"/>
+          <p:cNvSpPr txBox="1"/>
+          <p:nvPr/>
+        </p:nvSpPr>
+        <p:spPr>
+          <a:xfrm>
+            <a:off x="8350898" y="57727"/>
+            <a:ext cx="4187466" cy="369332"/>
+          </a:xfrm>
+          <a:prstGeom prst="rect">
+            <a:avLst/>
+          </a:prstGeom>
+          <a:noFill/>
+        </p:spPr>
+        <p:txBody>
+          <a:bodyPr wrap="square" rtlCol="0">
+            <a:spAutoFit/>
+          </a:bodyPr>
+          <a:lstStyle/>
+          <a:p>
+            <a:pPr algn="ctr"/>
+            <a:r>
+              <a:rPr lang="fr-FR" dirty="0">
+                <a:solidFill>
+                  <a:schemeClr val="bg1"/>
+                </a:solidFill>
+                <a:latin typeface="Alone On Earth" pitchFamily="50" charset="0"/>
+              </a:rPr>
+              <a:t>Etudiant 1 : Grégoire Colbert</a:t>
+            </a:r>
+          </a:p>
+        </p:txBody>
+      </p:sp>
+      <p:pic>
+        <p:nvPicPr>
+          <p:cNvPr id="5" name="Picture 6" descr="http://www.la-providence.net/images/vina_erida/logo_providence.jpg"/>
+          <p:cNvPicPr>
+            <a:picLocks noChangeAspect="1" noChangeArrowheads="1"/>
+          </p:cNvPicPr>
+          <p:nvPr/>
+        </p:nvPicPr>
+        <p:blipFill>
+          <a:blip r:embed="rId2">
+            <a:extLst>
+              <a:ext uri="{28A0092B-C50C-407E-A947-70E740481C1C}">
+                <a14:useLocalDpi xmlns:a14="http://schemas.microsoft.com/office/drawing/2010/main" val="0"/>
+              </a:ext>
+            </a:extLst>
+          </a:blip>
+          <a:srcRect/>
+          <a:stretch>
+            <a:fillRect/>
+          </a:stretch>
+        </p:blipFill>
+        <p:spPr bwMode="auto">
+          <a:xfrm>
+            <a:off x="142251" y="57727"/>
+            <a:ext cx="1868632" cy="565507"/>
+          </a:xfrm>
+          <a:prstGeom prst="rect">
+            <a:avLst/>
+          </a:prstGeom>
+          <a:noFill/>
+          <a:effectLst>
+            <a:outerShdw blurRad="50800" dist="38100" dir="8100000" algn="tr" rotWithShape="0">
+              <a:prstClr val="black">
+                <a:alpha val="40000"/>
+              </a:prstClr>
+            </a:outerShdw>
+          </a:effectLst>
+          <a:extLst>
+            <a:ext uri="{909E8E84-426E-40DD-AFC4-6F175D3DCCD1}">
+              <a14:hiddenFill xmlns:a14="http://schemas.microsoft.com/office/drawing/2010/main">
+                <a:solidFill>
+                  <a:srgbClr val="FFFFFF"/>
+                </a:solidFill>
+              </a14:hiddenFill>
+            </a:ext>
+          </a:extLst>
+        </p:spPr>
+      </p:pic>
+      <p:pic>
+        <p:nvPicPr>
+          <p:cNvPr id="6" name="Image 5"/>
+          <p:cNvPicPr>
+            <a:picLocks noChangeAspect="1"/>
+          </p:cNvPicPr>
+          <p:nvPr/>
+        </p:nvPicPr>
+        <p:blipFill>
+          <a:blip r:embed="rId3"/>
+          <a:stretch>
+            <a:fillRect/>
+          </a:stretch>
+        </p:blipFill>
+        <p:spPr>
+          <a:xfrm>
+            <a:off x="245348" y="1742642"/>
+            <a:ext cx="3099269" cy="763588"/>
+          </a:xfrm>
+          <a:prstGeom prst="rect">
+            <a:avLst/>
+          </a:prstGeom>
+        </p:spPr>
+      </p:pic>
+    </p:spTree>
+    <p:extLst>
+      <p:ext uri="{BB962C8B-B14F-4D97-AF65-F5344CB8AC3E}">
+        <p14:creationId xmlns:p14="http://schemas.microsoft.com/office/powerpoint/2010/main" val="696046793"/>
+      </p:ext>
+    </p:extLst>
+  </p:cSld>
+  <p:clrMapOvr>
+    <a:masterClrMapping/>
+  </p:clrMapOvr>
+  <p:timing>
+    <p:tnLst>
+      <p:par>
+        <p:cTn id="1" dur="indefinite" restart="never" nodeType="tmRoot"/>
+      </p:par>
+    </p:tnLst>
+  </p:timing>
+</p:sld>
+</file>
+
+<file path=ppt/slides/slide16.xml><?xml version="1.0" encoding="utf-8"?>
+<p:sld xmlns:a="http://schemas.openxmlformats.org/drawingml/2006/main" xmlns:r="http://schemas.openxmlformats.org/officeDocument/2006/relationships" xmlns:p="http://schemas.openxmlformats.org/presentationml/2006/main">
+  <p:cSld>
+    <p:bg>
+      <p:bgPr>
+        <a:solidFill>
+          <a:srgbClr val="CC3300"/>
+        </a:solidFill>
+        <a:effectLst/>
+      </p:bgPr>
+    </p:bg>
+    <p:spTree>
+      <p:nvGrpSpPr>
+        <p:cNvPr id="1" name=""/>
+        <p:cNvGrpSpPr/>
+        <p:nvPr/>
+      </p:nvGrpSpPr>
+      <p:grpSpPr>
+        <a:xfrm>
+          <a:off x="0" y="0"/>
+          <a:ext cx="0" cy="0"/>
+          <a:chOff x="0" y="0"/>
+          <a:chExt cx="0" cy="0"/>
+        </a:xfrm>
+      </p:grpSpPr>
+      <p:sp>
+        <p:nvSpPr>
+          <p:cNvPr id="2" name="Titre 1"/>
+          <p:cNvSpPr>
+            <a:spLocks noGrp="1"/>
+          </p:cNvSpPr>
+          <p:nvPr>
+            <p:ph type="ctrTitle"/>
+          </p:nvPr>
+        </p:nvSpPr>
+        <p:spPr>
+          <a:xfrm>
+            <a:off x="1500909" y="568036"/>
+            <a:ext cx="9144000" cy="785236"/>
+          </a:xfrm>
+        </p:spPr>
+        <p:txBody>
+          <a:bodyPr anchor="ctr">
+            <a:normAutofit fontScale="90000"/>
+          </a:bodyPr>
+          <a:lstStyle/>
+          <a:p>
+            <a:r>
+              <a:rPr lang="fr-FR" dirty="0" smtClean="0">
+                <a:solidFill>
+                  <a:schemeClr val="bg1"/>
+                </a:solidFill>
+                <a:latin typeface="Alone On Earth" pitchFamily="50" charset="0"/>
+              </a:rPr>
+              <a:t>Organisation du projet</a:t>
+            </a:r>
+            <a:endParaRPr lang="fr-FR" dirty="0">
+              <a:solidFill>
+                <a:schemeClr val="bg1"/>
+              </a:solidFill>
+              <a:latin typeface="Alone On Earth" pitchFamily="50" charset="0"/>
+            </a:endParaRPr>
+          </a:p>
+        </p:txBody>
+      </p:sp>
+      <p:sp>
+        <p:nvSpPr>
+          <p:cNvPr id="4" name="ZoneTexte 3"/>
+          <p:cNvSpPr txBox="1"/>
+          <p:nvPr/>
+        </p:nvSpPr>
+        <p:spPr>
+          <a:xfrm>
+            <a:off x="8350898" y="57727"/>
+            <a:ext cx="4187466" cy="369332"/>
+          </a:xfrm>
+          <a:prstGeom prst="rect">
+            <a:avLst/>
+          </a:prstGeom>
+          <a:noFill/>
+        </p:spPr>
+        <p:txBody>
+          <a:bodyPr wrap="square" rtlCol="0">
+            <a:spAutoFit/>
+          </a:bodyPr>
+          <a:lstStyle/>
+          <a:p>
+            <a:pPr algn="ctr"/>
+            <a:r>
+              <a:rPr lang="fr-FR" dirty="0">
+                <a:solidFill>
+                  <a:schemeClr val="bg1"/>
+                </a:solidFill>
+                <a:latin typeface="Alone On Earth" pitchFamily="50" charset="0"/>
+              </a:rPr>
+              <a:t>Etudiant 1 : Grégoire Colbert</a:t>
+            </a:r>
+          </a:p>
+        </p:txBody>
+      </p:sp>
+      <p:pic>
+        <p:nvPicPr>
+          <p:cNvPr id="5" name="Picture 6" descr="http://www.la-providence.net/images/vina_erida/logo_providence.jpg"/>
+          <p:cNvPicPr>
+            <a:picLocks noChangeAspect="1" noChangeArrowheads="1"/>
+          </p:cNvPicPr>
+          <p:nvPr/>
+        </p:nvPicPr>
+        <p:blipFill>
+          <a:blip r:embed="rId2">
+            <a:extLst>
+              <a:ext uri="{28A0092B-C50C-407E-A947-70E740481C1C}">
+                <a14:useLocalDpi xmlns:a14="http://schemas.microsoft.com/office/drawing/2010/main" val="0"/>
+              </a:ext>
+            </a:extLst>
+          </a:blip>
+          <a:srcRect/>
+          <a:stretch>
+            <a:fillRect/>
+          </a:stretch>
+        </p:blipFill>
+        <p:spPr bwMode="auto">
+          <a:xfrm>
+            <a:off x="142251" y="57727"/>
+            <a:ext cx="1868632" cy="565507"/>
+          </a:xfrm>
+          <a:prstGeom prst="rect">
+            <a:avLst/>
+          </a:prstGeom>
+          <a:noFill/>
+          <a:effectLst>
+            <a:outerShdw blurRad="50800" dist="38100" dir="8100000" algn="tr" rotWithShape="0">
+              <a:prstClr val="black">
+                <a:alpha val="40000"/>
+              </a:prstClr>
+            </a:outerShdw>
+          </a:effectLst>
+          <a:extLst>
+            <a:ext uri="{909E8E84-426E-40DD-AFC4-6F175D3DCCD1}">
+              <a14:hiddenFill xmlns:a14="http://schemas.microsoft.com/office/drawing/2010/main">
+                <a:solidFill>
+                  <a:srgbClr val="FFFFFF"/>
+                </a:solidFill>
+              </a14:hiddenFill>
+            </a:ext>
+          </a:extLst>
+        </p:spPr>
+      </p:pic>
+    </p:spTree>
+    <p:extLst>
+      <p:ext uri="{BB962C8B-B14F-4D97-AF65-F5344CB8AC3E}">
+        <p14:creationId xmlns:p14="http://schemas.microsoft.com/office/powerpoint/2010/main" val="1280564516"/>
+      </p:ext>
+    </p:extLst>
+  </p:cSld>
+  <p:clrMapOvr>
+    <a:masterClrMapping/>
+  </p:clrMapOvr>
+  <p:timing>
+    <p:tnLst>
+      <p:par>
+        <p:cTn id="1" dur="indefinite" restart="never" nodeType="tmRoot"/>
+      </p:par>
+    </p:tnLst>
+  </p:timing>
+</p:sld>
+</file>
+
+<file path=ppt/slides/slide17.xml><?xml version="1.0" encoding="utf-8"?>
+<p:sld xmlns:a="http://schemas.openxmlformats.org/drawingml/2006/main" xmlns:r="http://schemas.openxmlformats.org/officeDocument/2006/relationships" xmlns:p="http://schemas.openxmlformats.org/presentationml/2006/main">
+  <p:cSld>
+    <p:bg>
+      <p:bgPr>
+        <a:solidFill>
+          <a:srgbClr val="CC3300"/>
+        </a:solidFill>
+        <a:effectLst/>
+      </p:bgPr>
+    </p:bg>
+    <p:spTree>
+      <p:nvGrpSpPr>
+        <p:cNvPr id="1" name=""/>
+        <p:cNvGrpSpPr/>
+        <p:nvPr/>
+      </p:nvGrpSpPr>
+      <p:grpSpPr>
+        <a:xfrm>
+          <a:off x="0" y="0"/>
+          <a:ext cx="0" cy="0"/>
+          <a:chOff x="0" y="0"/>
+          <a:chExt cx="0" cy="0"/>
+        </a:xfrm>
+      </p:grpSpPr>
+      <p:sp>
+        <p:nvSpPr>
+          <p:cNvPr id="2" name="Titre 1"/>
+          <p:cNvSpPr>
+            <a:spLocks noGrp="1"/>
+          </p:cNvSpPr>
+          <p:nvPr>
+            <p:ph type="ctrTitle"/>
+          </p:nvPr>
+        </p:nvSpPr>
+        <p:spPr>
+          <a:xfrm>
+            <a:off x="1500909" y="568036"/>
+            <a:ext cx="9144000" cy="785236"/>
+          </a:xfrm>
+        </p:spPr>
+        <p:txBody>
+          <a:bodyPr anchor="ctr">
+            <a:normAutofit fontScale="90000"/>
+          </a:bodyPr>
+          <a:lstStyle/>
+          <a:p>
+            <a:r>
+              <a:rPr lang="fr-FR" dirty="0" smtClean="0">
+                <a:solidFill>
+                  <a:schemeClr val="bg1"/>
+                </a:solidFill>
+                <a:latin typeface="Alone On Earth" pitchFamily="50" charset="0"/>
+              </a:rPr>
+              <a:t>Organisation du projet</a:t>
+            </a:r>
+            <a:endParaRPr lang="fr-FR" dirty="0">
+              <a:solidFill>
+                <a:schemeClr val="bg1"/>
+              </a:solidFill>
+              <a:latin typeface="Alone On Earth" pitchFamily="50" charset="0"/>
+            </a:endParaRPr>
+          </a:p>
+        </p:txBody>
+      </p:sp>
+      <p:sp>
+        <p:nvSpPr>
+          <p:cNvPr id="4" name="ZoneTexte 3"/>
+          <p:cNvSpPr txBox="1"/>
+          <p:nvPr/>
+        </p:nvSpPr>
+        <p:spPr>
+          <a:xfrm>
+            <a:off x="8350898" y="57727"/>
+            <a:ext cx="4187466" cy="369332"/>
+          </a:xfrm>
+          <a:prstGeom prst="rect">
+            <a:avLst/>
+          </a:prstGeom>
+          <a:noFill/>
+        </p:spPr>
+        <p:txBody>
+          <a:bodyPr wrap="square" rtlCol="0">
+            <a:spAutoFit/>
+          </a:bodyPr>
+          <a:lstStyle/>
+          <a:p>
+            <a:pPr algn="ctr"/>
+            <a:r>
+              <a:rPr lang="fr-FR" dirty="0">
+                <a:solidFill>
+                  <a:schemeClr val="bg1"/>
+                </a:solidFill>
+                <a:latin typeface="Alone On Earth" pitchFamily="50" charset="0"/>
+              </a:rPr>
+              <a:t>Etudiant 1 : Grégoire Colbert</a:t>
+            </a:r>
+          </a:p>
+        </p:txBody>
+      </p:sp>
+      <p:pic>
+        <p:nvPicPr>
+          <p:cNvPr id="5" name="Picture 6" descr="http://www.la-providence.net/images/vina_erida/logo_providence.jpg"/>
+          <p:cNvPicPr>
+            <a:picLocks noChangeAspect="1" noChangeArrowheads="1"/>
+          </p:cNvPicPr>
+          <p:nvPr/>
+        </p:nvPicPr>
+        <p:blipFill>
+          <a:blip r:embed="rId2">
+            <a:extLst>
+              <a:ext uri="{28A0092B-C50C-407E-A947-70E740481C1C}">
+                <a14:useLocalDpi xmlns:a14="http://schemas.microsoft.com/office/drawing/2010/main" val="0"/>
+              </a:ext>
+            </a:extLst>
+          </a:blip>
+          <a:srcRect/>
+          <a:stretch>
+            <a:fillRect/>
+          </a:stretch>
+        </p:blipFill>
+        <p:spPr bwMode="auto">
+          <a:xfrm>
+            <a:off x="142251" y="57727"/>
+            <a:ext cx="1868632" cy="565507"/>
+          </a:xfrm>
+          <a:prstGeom prst="rect">
+            <a:avLst/>
+          </a:prstGeom>
+          <a:noFill/>
+          <a:effectLst>
+            <a:outerShdw blurRad="50800" dist="38100" dir="8100000" algn="tr" rotWithShape="0">
+              <a:prstClr val="black">
+                <a:alpha val="40000"/>
+              </a:prstClr>
+            </a:outerShdw>
+          </a:effectLst>
+          <a:extLst>
+            <a:ext uri="{909E8E84-426E-40DD-AFC4-6F175D3DCCD1}">
+              <a14:hiddenFill xmlns:a14="http://schemas.microsoft.com/office/drawing/2010/main">
+                <a:solidFill>
+                  <a:srgbClr val="FFFFFF"/>
+                </a:solidFill>
+              </a14:hiddenFill>
+            </a:ext>
+          </a:extLst>
+        </p:spPr>
+      </p:pic>
+    </p:spTree>
+    <p:extLst>
+      <p:ext uri="{BB962C8B-B14F-4D97-AF65-F5344CB8AC3E}">
+        <p14:creationId xmlns:p14="http://schemas.microsoft.com/office/powerpoint/2010/main" val="3448980616"/>
+      </p:ext>
+    </p:extLst>
+  </p:cSld>
+  <p:clrMapOvr>
+    <a:masterClrMapping/>
+  </p:clrMapOvr>
+  <p:timing>
+    <p:tnLst>
+      <p:par>
+        <p:cTn id="1" dur="indefinite" restart="never" nodeType="tmRoot"/>
+      </p:par>
+    </p:tnLst>
+  </p:timing>
+</p:sld>
+</file>
+
+<file path=ppt/slides/slide18.xml><?xml version="1.0" encoding="utf-8"?>
+<p:sld xmlns:a="http://schemas.openxmlformats.org/drawingml/2006/main" xmlns:r="http://schemas.openxmlformats.org/officeDocument/2006/relationships" xmlns:p="http://schemas.openxmlformats.org/presentationml/2006/main">
+  <p:cSld>
+    <p:bg>
+      <p:bgPr>
+        <a:solidFill>
+          <a:srgbClr val="CC3300"/>
+        </a:solidFill>
+        <a:effectLst/>
+      </p:bgPr>
+    </p:bg>
+    <p:spTree>
+      <p:nvGrpSpPr>
+        <p:cNvPr id="1" name=""/>
+        <p:cNvGrpSpPr/>
+        <p:nvPr/>
+      </p:nvGrpSpPr>
+      <p:grpSpPr>
+        <a:xfrm>
+          <a:off x="0" y="0"/>
+          <a:ext cx="0" cy="0"/>
+          <a:chOff x="0" y="0"/>
+          <a:chExt cx="0" cy="0"/>
+        </a:xfrm>
+      </p:grpSpPr>
+      <p:sp>
+        <p:nvSpPr>
+          <p:cNvPr id="2" name="Titre 1"/>
+          <p:cNvSpPr>
+            <a:spLocks noGrp="1"/>
+          </p:cNvSpPr>
+          <p:nvPr>
+            <p:ph type="ctrTitle"/>
+          </p:nvPr>
+        </p:nvSpPr>
+        <p:spPr>
+          <a:xfrm>
+            <a:off x="1500909" y="568036"/>
+            <a:ext cx="9144000" cy="785236"/>
+          </a:xfrm>
+        </p:spPr>
+        <p:txBody>
+          <a:bodyPr anchor="ctr">
+            <a:normAutofit fontScale="90000"/>
+          </a:bodyPr>
+          <a:lstStyle/>
+          <a:p>
+            <a:r>
+              <a:rPr lang="fr-FR" dirty="0" smtClean="0">
+                <a:solidFill>
+                  <a:schemeClr val="bg1"/>
+                </a:solidFill>
+                <a:latin typeface="Alone On Earth" pitchFamily="50" charset="0"/>
+              </a:rPr>
+              <a:t>Organisation du projet</a:t>
+            </a:r>
+            <a:endParaRPr lang="fr-FR" dirty="0">
+              <a:solidFill>
+                <a:schemeClr val="bg1"/>
+              </a:solidFill>
+              <a:latin typeface="Alone On Earth" pitchFamily="50" charset="0"/>
+            </a:endParaRPr>
+          </a:p>
+        </p:txBody>
+      </p:sp>
+      <p:sp>
+        <p:nvSpPr>
+          <p:cNvPr id="4" name="ZoneTexte 3"/>
+          <p:cNvSpPr txBox="1"/>
+          <p:nvPr/>
+        </p:nvSpPr>
+        <p:spPr>
+          <a:xfrm>
+            <a:off x="8350898" y="57727"/>
+            <a:ext cx="4187466" cy="369332"/>
+          </a:xfrm>
+          <a:prstGeom prst="rect">
+            <a:avLst/>
+          </a:prstGeom>
+          <a:noFill/>
+        </p:spPr>
+        <p:txBody>
+          <a:bodyPr wrap="square" rtlCol="0">
+            <a:spAutoFit/>
+          </a:bodyPr>
+          <a:lstStyle/>
+          <a:p>
+            <a:pPr algn="ctr"/>
+            <a:r>
+              <a:rPr lang="fr-FR" dirty="0">
+                <a:solidFill>
+                  <a:schemeClr val="bg1"/>
+                </a:solidFill>
+                <a:latin typeface="Alone On Earth" pitchFamily="50" charset="0"/>
+              </a:rPr>
+              <a:t>Etudiant 1 : Grégoire Colbert</a:t>
+            </a:r>
+          </a:p>
+        </p:txBody>
+      </p:sp>
+      <p:pic>
+        <p:nvPicPr>
+          <p:cNvPr id="5" name="Picture 6" descr="http://www.la-providence.net/images/vina_erida/logo_providence.jpg"/>
+          <p:cNvPicPr>
+            <a:picLocks noChangeAspect="1" noChangeArrowheads="1"/>
+          </p:cNvPicPr>
+          <p:nvPr/>
+        </p:nvPicPr>
+        <p:blipFill>
+          <a:blip r:embed="rId2">
+            <a:extLst>
+              <a:ext uri="{28A0092B-C50C-407E-A947-70E740481C1C}">
+                <a14:useLocalDpi xmlns:a14="http://schemas.microsoft.com/office/drawing/2010/main" val="0"/>
+              </a:ext>
+            </a:extLst>
+          </a:blip>
+          <a:srcRect/>
+          <a:stretch>
+            <a:fillRect/>
+          </a:stretch>
+        </p:blipFill>
+        <p:spPr bwMode="auto">
+          <a:xfrm>
+            <a:off x="142251" y="57727"/>
+            <a:ext cx="1868632" cy="565507"/>
+          </a:xfrm>
+          <a:prstGeom prst="rect">
+            <a:avLst/>
+          </a:prstGeom>
+          <a:noFill/>
+          <a:effectLst>
+            <a:outerShdw blurRad="50800" dist="38100" dir="8100000" algn="tr" rotWithShape="0">
+              <a:prstClr val="black">
+                <a:alpha val="40000"/>
+              </a:prstClr>
+            </a:outerShdw>
+          </a:effectLst>
+          <a:extLst>
+            <a:ext uri="{909E8E84-426E-40DD-AFC4-6F175D3DCCD1}">
+              <a14:hiddenFill xmlns:a14="http://schemas.microsoft.com/office/drawing/2010/main">
+                <a:solidFill>
+                  <a:srgbClr val="FFFFFF"/>
+                </a:solidFill>
+              </a14:hiddenFill>
+            </a:ext>
+          </a:extLst>
+        </p:spPr>
+      </p:pic>
+    </p:spTree>
+    <p:extLst>
+      <p:ext uri="{BB962C8B-B14F-4D97-AF65-F5344CB8AC3E}">
+        <p14:creationId xmlns:p14="http://schemas.microsoft.com/office/powerpoint/2010/main" val="3551394295"/>
+      </p:ext>
+    </p:extLst>
+  </p:cSld>
+  <p:clrMapOvr>
+    <a:masterClrMapping/>
+  </p:clrMapOvr>
+  <p:timing>
+    <p:tnLst>
+      <p:par>
+        <p:cTn id="1" dur="indefinite" restart="never" nodeType="tmRoot"/>
+      </p:par>
+    </p:tnLst>
+  </p:timing>
+</p:sld>
+</file>
+
+<file path=ppt/slides/slide19.xml><?xml version="1.0" encoding="utf-8"?>
+<p:sld xmlns:a="http://schemas.openxmlformats.org/drawingml/2006/main" xmlns:r="http://schemas.openxmlformats.org/officeDocument/2006/relationships" xmlns:p="http://schemas.openxmlformats.org/presentationml/2006/main">
+  <p:cSld>
+    <p:bg>
+      <p:bgPr>
+        <a:solidFill>
+          <a:srgbClr val="CC3300"/>
+        </a:solidFill>
+        <a:effectLst/>
+      </p:bgPr>
+    </p:bg>
+    <p:spTree>
+      <p:nvGrpSpPr>
+        <p:cNvPr id="1" name=""/>
+        <p:cNvGrpSpPr/>
+        <p:nvPr/>
+      </p:nvGrpSpPr>
+      <p:grpSpPr>
+        <a:xfrm>
+          <a:off x="0" y="0"/>
+          <a:ext cx="0" cy="0"/>
+          <a:chOff x="0" y="0"/>
+          <a:chExt cx="0" cy="0"/>
+        </a:xfrm>
+      </p:grpSpPr>
+      <p:sp>
+        <p:nvSpPr>
+          <p:cNvPr id="2" name="Titre 1"/>
+          <p:cNvSpPr>
+            <a:spLocks noGrp="1"/>
+          </p:cNvSpPr>
+          <p:nvPr>
+            <p:ph type="ctrTitle"/>
+          </p:nvPr>
+        </p:nvSpPr>
+        <p:spPr>
+          <a:xfrm>
+            <a:off x="1500909" y="568036"/>
+            <a:ext cx="9144000" cy="785236"/>
+          </a:xfrm>
+        </p:spPr>
+        <p:txBody>
+          <a:bodyPr anchor="ctr">
+            <a:normAutofit fontScale="90000"/>
+          </a:bodyPr>
+          <a:lstStyle/>
+          <a:p>
+            <a:r>
+              <a:rPr lang="fr-FR" dirty="0" smtClean="0">
+                <a:solidFill>
+                  <a:schemeClr val="bg1"/>
+                </a:solidFill>
+                <a:latin typeface="Alone On Earth" pitchFamily="50" charset="0"/>
+              </a:rPr>
+              <a:t>Organisation du projet</a:t>
+            </a:r>
+            <a:endParaRPr lang="fr-FR" dirty="0">
+              <a:solidFill>
+                <a:schemeClr val="bg1"/>
+              </a:solidFill>
+              <a:latin typeface="Alone On Earth" pitchFamily="50" charset="0"/>
+            </a:endParaRPr>
+          </a:p>
+        </p:txBody>
+      </p:sp>
+      <p:sp>
+        <p:nvSpPr>
+          <p:cNvPr id="4" name="ZoneTexte 3"/>
+          <p:cNvSpPr txBox="1"/>
+          <p:nvPr/>
+        </p:nvSpPr>
+        <p:spPr>
+          <a:xfrm>
+            <a:off x="8350898" y="57727"/>
+            <a:ext cx="4187466" cy="369332"/>
+          </a:xfrm>
+          <a:prstGeom prst="rect">
+            <a:avLst/>
+          </a:prstGeom>
+          <a:noFill/>
+        </p:spPr>
+        <p:txBody>
+          <a:bodyPr wrap="square" rtlCol="0">
+            <a:spAutoFit/>
+          </a:bodyPr>
+          <a:lstStyle/>
+          <a:p>
+            <a:pPr algn="ctr"/>
+            <a:r>
+              <a:rPr lang="fr-FR" dirty="0">
+                <a:solidFill>
+                  <a:schemeClr val="bg1"/>
+                </a:solidFill>
+                <a:latin typeface="Alone On Earth" pitchFamily="50" charset="0"/>
+              </a:rPr>
+              <a:t>Etudiant 1 : Grégoire Colbert</a:t>
+            </a:r>
+          </a:p>
+        </p:txBody>
+      </p:sp>
+      <p:pic>
+        <p:nvPicPr>
+          <p:cNvPr id="5" name="Picture 6" descr="http://www.la-providence.net/images/vina_erida/logo_providence.jpg"/>
+          <p:cNvPicPr>
+            <a:picLocks noChangeAspect="1" noChangeArrowheads="1"/>
+          </p:cNvPicPr>
+          <p:nvPr/>
+        </p:nvPicPr>
+        <p:blipFill>
+          <a:blip r:embed="rId2">
+            <a:extLst>
+              <a:ext uri="{28A0092B-C50C-407E-A947-70E740481C1C}">
+                <a14:useLocalDpi xmlns:a14="http://schemas.microsoft.com/office/drawing/2010/main" val="0"/>
+              </a:ext>
+            </a:extLst>
+          </a:blip>
+          <a:srcRect/>
+          <a:stretch>
+            <a:fillRect/>
+          </a:stretch>
+        </p:blipFill>
+        <p:spPr bwMode="auto">
+          <a:xfrm>
+            <a:off x="142251" y="57727"/>
+            <a:ext cx="1868632" cy="565507"/>
+          </a:xfrm>
+          <a:prstGeom prst="rect">
+            <a:avLst/>
+          </a:prstGeom>
+          <a:noFill/>
+          <a:effectLst>
+            <a:outerShdw blurRad="50800" dist="38100" dir="8100000" algn="tr" rotWithShape="0">
+              <a:prstClr val="black">
+                <a:alpha val="40000"/>
+              </a:prstClr>
+            </a:outerShdw>
+          </a:effectLst>
+          <a:extLst>
+            <a:ext uri="{909E8E84-426E-40DD-AFC4-6F175D3DCCD1}">
+              <a14:hiddenFill xmlns:a14="http://schemas.microsoft.com/office/drawing/2010/main">
+                <a:solidFill>
+                  <a:srgbClr val="FFFFFF"/>
+                </a:solidFill>
+              </a14:hiddenFill>
+            </a:ext>
+          </a:extLst>
+        </p:spPr>
+      </p:pic>
+    </p:spTree>
+    <p:extLst>
+      <p:ext uri="{BB962C8B-B14F-4D97-AF65-F5344CB8AC3E}">
+        <p14:creationId xmlns:p14="http://schemas.microsoft.com/office/powerpoint/2010/main" val="2168811717"/>
       </p:ext>
     </p:extLst>
   </p:cSld>
@@ -3760,16 +5706,7 @@
                 </a:solidFill>
                 <a:latin typeface="Alone On Earth" pitchFamily="50" charset="0"/>
               </a:rPr>
-              <a:t>Présentation du </a:t>
-            </a:r>
-            <a:r>
-              <a:rPr lang="fr-FR" dirty="0" smtClean="0">
-                <a:solidFill>
-                  <a:schemeClr val="bg1"/>
-                </a:solidFill>
-                <a:latin typeface="Alone On Earth" pitchFamily="50" charset="0"/>
-              </a:rPr>
-              <a:t>projet</a:t>
+              <a:t>Présentation du projet</a:t>
             </a:r>
           </a:p>
           <a:p>
@@ -3790,16 +5727,7 @@
                 </a:solidFill>
                 <a:latin typeface="Alone On Earth" pitchFamily="50" charset="0"/>
               </a:rPr>
-              <a:t>Organisation/Travail </a:t>
-            </a:r>
-            <a:r>
-              <a:rPr lang="fr-FR" dirty="0" smtClean="0">
-                <a:solidFill>
-                  <a:schemeClr val="bg1"/>
-                </a:solidFill>
-                <a:latin typeface="Alone On Earth" pitchFamily="50" charset="0"/>
-              </a:rPr>
-              <a:t>d’équipe</a:t>
+              <a:t>Organisation/Travail d’équipe</a:t>
             </a:r>
           </a:p>
           <a:p>
@@ -4111,6 +6039,174 @@
     <p:extLst>
       <p:ext uri="{BB962C8B-B14F-4D97-AF65-F5344CB8AC3E}">
         <p14:creationId xmlns:p14="http://schemas.microsoft.com/office/powerpoint/2010/main" val="3981502616"/>
+      </p:ext>
+    </p:extLst>
+  </p:cSld>
+  <p:clrMapOvr>
+    <a:masterClrMapping/>
+  </p:clrMapOvr>
+  <p:timing>
+    <p:tnLst>
+      <p:par>
+        <p:cTn id="1" dur="indefinite" restart="never" nodeType="tmRoot"/>
+      </p:par>
+    </p:tnLst>
+  </p:timing>
+</p:sld>
+</file>
+
+<file path=ppt/slides/slide20.xml><?xml version="1.0" encoding="utf-8"?>
+<p:sld xmlns:a="http://schemas.openxmlformats.org/drawingml/2006/main" xmlns:r="http://schemas.openxmlformats.org/officeDocument/2006/relationships" xmlns:p="http://schemas.openxmlformats.org/presentationml/2006/main">
+  <p:cSld>
+    <p:bg>
+      <p:bgPr>
+        <a:solidFill>
+          <a:srgbClr val="CC3300"/>
+        </a:solidFill>
+        <a:effectLst/>
+      </p:bgPr>
+    </p:bg>
+    <p:spTree>
+      <p:nvGrpSpPr>
+        <p:cNvPr id="1" name=""/>
+        <p:cNvGrpSpPr/>
+        <p:nvPr/>
+      </p:nvGrpSpPr>
+      <p:grpSpPr>
+        <a:xfrm>
+          <a:off x="0" y="0"/>
+          <a:ext cx="0" cy="0"/>
+          <a:chOff x="0" y="0"/>
+          <a:chExt cx="0" cy="0"/>
+        </a:xfrm>
+      </p:grpSpPr>
+      <p:sp>
+        <p:nvSpPr>
+          <p:cNvPr id="2" name="Titre 1"/>
+          <p:cNvSpPr>
+            <a:spLocks noGrp="1"/>
+          </p:cNvSpPr>
+          <p:nvPr>
+            <p:ph type="ctrTitle"/>
+          </p:nvPr>
+        </p:nvSpPr>
+        <p:spPr>
+          <a:xfrm>
+            <a:off x="1500909" y="568036"/>
+            <a:ext cx="9144000" cy="785236"/>
+          </a:xfrm>
+        </p:spPr>
+        <p:txBody>
+          <a:bodyPr anchor="ctr">
+            <a:normAutofit fontScale="90000"/>
+          </a:bodyPr>
+          <a:lstStyle/>
+          <a:p>
+            <a:r>
+              <a:rPr lang="fr-FR" dirty="0" smtClean="0">
+                <a:solidFill>
+                  <a:schemeClr val="bg1"/>
+                </a:solidFill>
+                <a:latin typeface="Alone On Earth" pitchFamily="50" charset="0"/>
+              </a:rPr>
+              <a:t>Organisation du projet</a:t>
+            </a:r>
+            <a:endParaRPr lang="fr-FR" dirty="0">
+              <a:solidFill>
+                <a:schemeClr val="bg1"/>
+              </a:solidFill>
+              <a:latin typeface="Alone On Earth" pitchFamily="50" charset="0"/>
+            </a:endParaRPr>
+          </a:p>
+        </p:txBody>
+      </p:sp>
+      <p:sp>
+        <p:nvSpPr>
+          <p:cNvPr id="4" name="ZoneTexte 3"/>
+          <p:cNvSpPr txBox="1"/>
+          <p:nvPr/>
+        </p:nvSpPr>
+        <p:spPr>
+          <a:xfrm>
+            <a:off x="8350898" y="57727"/>
+            <a:ext cx="4187466" cy="369332"/>
+          </a:xfrm>
+          <a:prstGeom prst="rect">
+            <a:avLst/>
+          </a:prstGeom>
+          <a:noFill/>
+        </p:spPr>
+        <p:txBody>
+          <a:bodyPr wrap="square" rtlCol="0">
+            <a:spAutoFit/>
+          </a:bodyPr>
+          <a:lstStyle/>
+          <a:p>
+            <a:pPr algn="ctr"/>
+            <a:r>
+              <a:rPr lang="fr-FR" dirty="0">
+                <a:solidFill>
+                  <a:schemeClr val="bg1"/>
+                </a:solidFill>
+                <a:latin typeface="Alone On Earth" pitchFamily="50" charset="0"/>
+              </a:rPr>
+              <a:t>Etudiant 1 : Grégoire Colbert</a:t>
+            </a:r>
+          </a:p>
+        </p:txBody>
+      </p:sp>
+      <p:pic>
+        <p:nvPicPr>
+          <p:cNvPr id="5" name="Picture 6" descr="http://www.la-providence.net/images/vina_erida/logo_providence.jpg"/>
+          <p:cNvPicPr>
+            <a:picLocks noChangeAspect="1" noChangeArrowheads="1"/>
+          </p:cNvPicPr>
+          <p:nvPr/>
+        </p:nvPicPr>
+        <p:blipFill>
+          <a:blip r:embed="rId2">
+            <a:extLst>
+              <a:ext uri="{28A0092B-C50C-407E-A947-70E740481C1C}">
+                <a14:useLocalDpi xmlns:a14="http://schemas.microsoft.com/office/drawing/2010/main" val="0"/>
+              </a:ext>
+            </a:extLst>
+          </a:blip>
+          <a:srcRect/>
+          <a:stretch>
+            <a:fillRect/>
+          </a:stretch>
+        </p:blipFill>
+        <p:spPr bwMode="auto">
+          <a:xfrm>
+            <a:off x="142251" y="57727"/>
+            <a:ext cx="1868632" cy="565507"/>
+          </a:xfrm>
+          <a:prstGeom prst="rect">
+            <a:avLst/>
+          </a:prstGeom>
+          <a:noFill/>
+          <a:effectLst>
+            <a:outerShdw blurRad="50800" dist="38100" dir="8100000" algn="tr" rotWithShape="0">
+              <a:prstClr val="black">
+                <a:alpha val="40000"/>
+              </a:prstClr>
+            </a:outerShdw>
+          </a:effectLst>
+          <a:extLst>
+            <a:ext uri="{909E8E84-426E-40DD-AFC4-6F175D3DCCD1}">
+              <a14:hiddenFill xmlns:a14="http://schemas.microsoft.com/office/drawing/2010/main">
+                <a:solidFill>
+                  <a:srgbClr val="FFFFFF"/>
+                </a:solidFill>
+              </a14:hiddenFill>
+            </a:ext>
+          </a:extLst>
+        </p:spPr>
+      </p:pic>
+    </p:spTree>
+    <p:extLst>
+      <p:ext uri="{BB962C8B-B14F-4D97-AF65-F5344CB8AC3E}">
+        <p14:creationId xmlns:p14="http://schemas.microsoft.com/office/powerpoint/2010/main" val="1733299465"/>
       </p:ext>
     </p:extLst>
   </p:cSld>
@@ -4224,12 +6320,6 @@
               </a:rPr>
               <a:t>Etudiant 1 : Grégoire Colbert</a:t>
             </a:r>
-            <a:endParaRPr lang="fr-FR" dirty="0">
-              <a:solidFill>
-                <a:schemeClr val="bg1"/>
-              </a:solidFill>
-              <a:latin typeface="Alone On Earth" pitchFamily="50" charset="0"/>
-            </a:endParaRPr>
           </a:p>
         </p:txBody>
       </p:sp>
@@ -4691,12 +6781,6 @@
               </a:rPr>
               <a:t>Etudiant 1 : Grégoire Colbert</a:t>
             </a:r>
-            <a:endParaRPr lang="fr-FR" dirty="0">
-              <a:solidFill>
-                <a:schemeClr val="bg1"/>
-              </a:solidFill>
-              <a:latin typeface="Alone On Earth" pitchFamily="50" charset="0"/>
-            </a:endParaRPr>
           </a:p>
         </p:txBody>
       </p:sp>
@@ -5296,12 +7380,6 @@
               </a:rPr>
               <a:t>Etudiant 1 : Grégoire Colbert</a:t>
             </a:r>
-            <a:endParaRPr lang="fr-FR" dirty="0">
-              <a:solidFill>
-                <a:schemeClr val="bg1"/>
-              </a:solidFill>
-              <a:latin typeface="Alone On Earth" pitchFamily="50" charset="0"/>
-            </a:endParaRPr>
           </a:p>
         </p:txBody>
       </p:sp>
@@ -5903,12 +7981,6 @@
               </a:rPr>
               <a:t>Etudiant 1 : Grégoire Colbert</a:t>
             </a:r>
-            <a:endParaRPr lang="fr-FR" dirty="0">
-              <a:solidFill>
-                <a:schemeClr val="bg1"/>
-              </a:solidFill>
-              <a:latin typeface="Alone On Earth" pitchFamily="50" charset="0"/>
-            </a:endParaRPr>
           </a:p>
         </p:txBody>
       </p:sp>
@@ -5960,10 +8032,813 @@
           </a:extLst>
         </p:spPr>
       </p:pic>
+      <p:sp>
+        <p:nvSpPr>
+          <p:cNvPr id="3" name="ZoneTexte 2"/>
+          <p:cNvSpPr txBox="1"/>
+          <p:nvPr/>
+        </p:nvSpPr>
+        <p:spPr>
+          <a:xfrm>
+            <a:off x="1042736" y="1936412"/>
+            <a:ext cx="2662989" cy="400110"/>
+          </a:xfrm>
+          <a:prstGeom prst="rect">
+            <a:avLst/>
+          </a:prstGeom>
+          <a:noFill/>
+        </p:spPr>
+        <p:txBody>
+          <a:bodyPr wrap="square" rtlCol="0">
+            <a:spAutoFit/>
+          </a:bodyPr>
+          <a:lstStyle/>
+          <a:p>
+            <a:r>
+              <a:rPr lang="fr-FR" sz="2000" dirty="0" smtClean="0">
+                <a:solidFill>
+                  <a:schemeClr val="bg1"/>
+                </a:solidFill>
+              </a:rPr>
+              <a:t>GitHub</a:t>
+            </a:r>
+          </a:p>
+        </p:txBody>
+      </p:sp>
+      <p:pic>
+        <p:nvPicPr>
+          <p:cNvPr id="6" name="Image 5"/>
+          <p:cNvPicPr>
+            <a:picLocks noChangeAspect="1"/>
+          </p:cNvPicPr>
+          <p:nvPr/>
+        </p:nvPicPr>
+        <p:blipFill>
+          <a:blip r:embed="rId3"/>
+          <a:stretch>
+            <a:fillRect/>
+          </a:stretch>
+        </p:blipFill>
+        <p:spPr>
+          <a:xfrm>
+            <a:off x="5541023" y="3049504"/>
+            <a:ext cx="5619750" cy="3486150"/>
+          </a:xfrm>
+          <a:prstGeom prst="rect">
+            <a:avLst/>
+          </a:prstGeom>
+        </p:spPr>
+      </p:pic>
+      <p:sp>
+        <p:nvSpPr>
+          <p:cNvPr id="7" name="ZoneTexte 6"/>
+          <p:cNvSpPr txBox="1"/>
+          <p:nvPr/>
+        </p:nvSpPr>
+        <p:spPr>
+          <a:xfrm>
+            <a:off x="1042736" y="2527102"/>
+            <a:ext cx="2629159" cy="400110"/>
+          </a:xfrm>
+          <a:prstGeom prst="rect">
+            <a:avLst/>
+          </a:prstGeom>
+          <a:noFill/>
+        </p:spPr>
+        <p:txBody>
+          <a:bodyPr wrap="square" rtlCol="0">
+            <a:spAutoFit/>
+          </a:bodyPr>
+          <a:lstStyle/>
+          <a:p>
+            <a:r>
+              <a:rPr lang="fr-FR" sz="2000" dirty="0" smtClean="0">
+                <a:solidFill>
+                  <a:schemeClr val="bg1"/>
+                </a:solidFill>
+              </a:rPr>
+              <a:t>Répartition des tâches</a:t>
+            </a:r>
+            <a:endParaRPr lang="fr-FR" sz="2000" dirty="0">
+              <a:solidFill>
+                <a:schemeClr val="bg1"/>
+              </a:solidFill>
+            </a:endParaRPr>
+          </a:p>
+        </p:txBody>
+      </p:sp>
+      <p:sp>
+        <p:nvSpPr>
+          <p:cNvPr id="8" name="ZoneTexte 7"/>
+          <p:cNvSpPr txBox="1"/>
+          <p:nvPr/>
+        </p:nvSpPr>
+        <p:spPr>
+          <a:xfrm>
+            <a:off x="7844588" y="2403173"/>
+            <a:ext cx="2326105" cy="646331"/>
+          </a:xfrm>
+          <a:prstGeom prst="rect">
+            <a:avLst/>
+          </a:prstGeom>
+          <a:noFill/>
+        </p:spPr>
+        <p:txBody>
+          <a:bodyPr wrap="square" rtlCol="0">
+            <a:spAutoFit/>
+          </a:bodyPr>
+          <a:lstStyle/>
+          <a:p>
+            <a:r>
+              <a:rPr lang="fr-FR" sz="3600" dirty="0" smtClean="0">
+                <a:solidFill>
+                  <a:schemeClr val="bg1"/>
+                </a:solidFill>
+              </a:rPr>
+              <a:t>CRA</a:t>
+            </a:r>
+            <a:endParaRPr lang="fr-FR" sz="3600" dirty="0">
+              <a:solidFill>
+                <a:schemeClr val="bg1"/>
+              </a:solidFill>
+            </a:endParaRPr>
+          </a:p>
+        </p:txBody>
+      </p:sp>
     </p:spTree>
     <p:extLst>
       <p:ext uri="{BB962C8B-B14F-4D97-AF65-F5344CB8AC3E}">
         <p14:creationId xmlns:p14="http://schemas.microsoft.com/office/powerpoint/2010/main" val="3356119690"/>
+      </p:ext>
+    </p:extLst>
+  </p:cSld>
+  <p:clrMapOvr>
+    <a:masterClrMapping/>
+  </p:clrMapOvr>
+  <p:timing>
+    <p:tnLst>
+      <p:par>
+        <p:cTn id="1" dur="indefinite" restart="never" nodeType="tmRoot"/>
+      </p:par>
+    </p:tnLst>
+  </p:timing>
+</p:sld>
+</file>
+
+<file path=ppt/slides/slide7.xml><?xml version="1.0" encoding="utf-8"?>
+<p:sld xmlns:a="http://schemas.openxmlformats.org/drawingml/2006/main" xmlns:r="http://schemas.openxmlformats.org/officeDocument/2006/relationships" xmlns:p="http://schemas.openxmlformats.org/presentationml/2006/main">
+  <p:cSld>
+    <p:bg>
+      <p:bgPr>
+        <a:solidFill>
+          <a:srgbClr val="CC3300"/>
+        </a:solidFill>
+        <a:effectLst/>
+      </p:bgPr>
+    </p:bg>
+    <p:spTree>
+      <p:nvGrpSpPr>
+        <p:cNvPr id="1" name=""/>
+        <p:cNvGrpSpPr/>
+        <p:nvPr/>
+      </p:nvGrpSpPr>
+      <p:grpSpPr>
+        <a:xfrm>
+          <a:off x="0" y="0"/>
+          <a:ext cx="0" cy="0"/>
+          <a:chOff x="0" y="0"/>
+          <a:chExt cx="0" cy="0"/>
+        </a:xfrm>
+      </p:grpSpPr>
+      <p:sp>
+        <p:nvSpPr>
+          <p:cNvPr id="2" name="Titre 1"/>
+          <p:cNvSpPr>
+            <a:spLocks noGrp="1"/>
+          </p:cNvSpPr>
+          <p:nvPr>
+            <p:ph type="ctrTitle"/>
+          </p:nvPr>
+        </p:nvSpPr>
+        <p:spPr>
+          <a:xfrm>
+            <a:off x="1500909" y="568036"/>
+            <a:ext cx="9144000" cy="785236"/>
+          </a:xfrm>
+        </p:spPr>
+        <p:txBody>
+          <a:bodyPr anchor="ctr">
+            <a:normAutofit fontScale="90000"/>
+          </a:bodyPr>
+          <a:lstStyle/>
+          <a:p>
+            <a:r>
+              <a:rPr lang="fr-FR" dirty="0" smtClean="0">
+                <a:solidFill>
+                  <a:schemeClr val="bg1"/>
+                </a:solidFill>
+                <a:latin typeface="Alone On Earth" pitchFamily="50" charset="0"/>
+              </a:rPr>
+              <a:t>Analyse fonctionnelle</a:t>
+            </a:r>
+            <a:endParaRPr lang="fr-FR" dirty="0">
+              <a:solidFill>
+                <a:schemeClr val="bg1"/>
+              </a:solidFill>
+              <a:latin typeface="Alone On Earth" pitchFamily="50" charset="0"/>
+            </a:endParaRPr>
+          </a:p>
+        </p:txBody>
+      </p:sp>
+      <p:sp>
+        <p:nvSpPr>
+          <p:cNvPr id="4" name="ZoneTexte 3"/>
+          <p:cNvSpPr txBox="1"/>
+          <p:nvPr/>
+        </p:nvSpPr>
+        <p:spPr>
+          <a:xfrm>
+            <a:off x="8350898" y="57727"/>
+            <a:ext cx="4187466" cy="369332"/>
+          </a:xfrm>
+          <a:prstGeom prst="rect">
+            <a:avLst/>
+          </a:prstGeom>
+          <a:noFill/>
+        </p:spPr>
+        <p:txBody>
+          <a:bodyPr wrap="square" rtlCol="0">
+            <a:spAutoFit/>
+          </a:bodyPr>
+          <a:lstStyle/>
+          <a:p>
+            <a:pPr algn="ctr"/>
+            <a:r>
+              <a:rPr lang="fr-FR" dirty="0">
+                <a:solidFill>
+                  <a:schemeClr val="bg1"/>
+                </a:solidFill>
+                <a:latin typeface="Alone On Earth" pitchFamily="50" charset="0"/>
+              </a:rPr>
+              <a:t>Etudiant 1 : Grégoire Colbert</a:t>
+            </a:r>
+          </a:p>
+        </p:txBody>
+      </p:sp>
+      <p:pic>
+        <p:nvPicPr>
+          <p:cNvPr id="5" name="Picture 6" descr="http://www.la-providence.net/images/vina_erida/logo_providence.jpg"/>
+          <p:cNvPicPr>
+            <a:picLocks noChangeAspect="1" noChangeArrowheads="1"/>
+          </p:cNvPicPr>
+          <p:nvPr/>
+        </p:nvPicPr>
+        <p:blipFill>
+          <a:blip r:embed="rId2">
+            <a:extLst>
+              <a:ext uri="{28A0092B-C50C-407E-A947-70E740481C1C}">
+                <a14:useLocalDpi xmlns:a14="http://schemas.microsoft.com/office/drawing/2010/main" val="0"/>
+              </a:ext>
+            </a:extLst>
+          </a:blip>
+          <a:srcRect/>
+          <a:stretch>
+            <a:fillRect/>
+          </a:stretch>
+        </p:blipFill>
+        <p:spPr bwMode="auto">
+          <a:xfrm>
+            <a:off x="142251" y="57727"/>
+            <a:ext cx="1868632" cy="565507"/>
+          </a:xfrm>
+          <a:prstGeom prst="rect">
+            <a:avLst/>
+          </a:prstGeom>
+          <a:noFill/>
+          <a:effectLst>
+            <a:outerShdw blurRad="50800" dist="38100" dir="8100000" algn="tr" rotWithShape="0">
+              <a:prstClr val="black">
+                <a:alpha val="40000"/>
+              </a:prstClr>
+            </a:outerShdw>
+          </a:effectLst>
+          <a:extLst>
+            <a:ext uri="{909E8E84-426E-40DD-AFC4-6F175D3DCCD1}">
+              <a14:hiddenFill xmlns:a14="http://schemas.microsoft.com/office/drawing/2010/main">
+                <a:solidFill>
+                  <a:srgbClr val="FFFFFF"/>
+                </a:solidFill>
+              </a14:hiddenFill>
+            </a:ext>
+          </a:extLst>
+        </p:spPr>
+      </p:pic>
+      <p:pic>
+        <p:nvPicPr>
+          <p:cNvPr id="10" name="Image 9"/>
+          <p:cNvPicPr>
+            <a:picLocks noChangeAspect="1"/>
+          </p:cNvPicPr>
+          <p:nvPr/>
+        </p:nvPicPr>
+        <p:blipFill>
+          <a:blip r:embed="rId3">
+            <a:extLst>
+              <a:ext uri="{28A0092B-C50C-407E-A947-70E740481C1C}">
+                <a14:useLocalDpi xmlns:a14="http://schemas.microsoft.com/office/drawing/2010/main" val="0"/>
+              </a:ext>
+            </a:extLst>
+          </a:blip>
+          <a:stretch>
+            <a:fillRect/>
+          </a:stretch>
+        </p:blipFill>
+        <p:spPr>
+          <a:xfrm>
+            <a:off x="2523077" y="2207641"/>
+            <a:ext cx="7457282" cy="4443541"/>
+          </a:xfrm>
+          <a:prstGeom prst="rect">
+            <a:avLst/>
+          </a:prstGeom>
+        </p:spPr>
+      </p:pic>
+      <p:sp>
+        <p:nvSpPr>
+          <p:cNvPr id="11" name="ZoneTexte 10"/>
+          <p:cNvSpPr txBox="1"/>
+          <p:nvPr/>
+        </p:nvSpPr>
+        <p:spPr>
+          <a:xfrm>
+            <a:off x="994610" y="1684421"/>
+            <a:ext cx="8823157" cy="523220"/>
+          </a:xfrm>
+          <a:prstGeom prst="rect">
+            <a:avLst/>
+          </a:prstGeom>
+          <a:noFill/>
+        </p:spPr>
+        <p:txBody>
+          <a:bodyPr wrap="square" rtlCol="0">
+            <a:spAutoFit/>
+          </a:bodyPr>
+          <a:lstStyle/>
+          <a:p>
+            <a:r>
+              <a:rPr lang="fr-FR" sz="2800" dirty="0" smtClean="0">
+                <a:solidFill>
+                  <a:schemeClr val="bg1"/>
+                </a:solidFill>
+              </a:rPr>
+              <a:t>Diagramme de cas d’utilisation générale simplifié</a:t>
+            </a:r>
+            <a:endParaRPr lang="fr-FR" sz="2800" dirty="0">
+              <a:solidFill>
+                <a:schemeClr val="bg1"/>
+              </a:solidFill>
+            </a:endParaRPr>
+          </a:p>
+        </p:txBody>
+      </p:sp>
+    </p:spTree>
+    <p:extLst>
+      <p:ext uri="{BB962C8B-B14F-4D97-AF65-F5344CB8AC3E}">
+        <p14:creationId xmlns:p14="http://schemas.microsoft.com/office/powerpoint/2010/main" val="3045679489"/>
+      </p:ext>
+    </p:extLst>
+  </p:cSld>
+  <p:clrMapOvr>
+    <a:masterClrMapping/>
+  </p:clrMapOvr>
+  <p:timing>
+    <p:tnLst>
+      <p:par>
+        <p:cTn id="1" dur="indefinite" restart="never" nodeType="tmRoot"/>
+      </p:par>
+    </p:tnLst>
+  </p:timing>
+</p:sld>
+</file>
+
+<file path=ppt/slides/slide8.xml><?xml version="1.0" encoding="utf-8"?>
+<p:sld xmlns:a="http://schemas.openxmlformats.org/drawingml/2006/main" xmlns:r="http://schemas.openxmlformats.org/officeDocument/2006/relationships" xmlns:p="http://schemas.openxmlformats.org/presentationml/2006/main">
+  <p:cSld>
+    <p:bg>
+      <p:bgPr>
+        <a:solidFill>
+          <a:srgbClr val="CC3300"/>
+        </a:solidFill>
+        <a:effectLst/>
+      </p:bgPr>
+    </p:bg>
+    <p:spTree>
+      <p:nvGrpSpPr>
+        <p:cNvPr id="1" name=""/>
+        <p:cNvGrpSpPr/>
+        <p:nvPr/>
+      </p:nvGrpSpPr>
+      <p:grpSpPr>
+        <a:xfrm>
+          <a:off x="0" y="0"/>
+          <a:ext cx="0" cy="0"/>
+          <a:chOff x="0" y="0"/>
+          <a:chExt cx="0" cy="0"/>
+        </a:xfrm>
+      </p:grpSpPr>
+      <p:sp>
+        <p:nvSpPr>
+          <p:cNvPr id="2" name="Titre 1"/>
+          <p:cNvSpPr>
+            <a:spLocks noGrp="1"/>
+          </p:cNvSpPr>
+          <p:nvPr>
+            <p:ph type="ctrTitle"/>
+          </p:nvPr>
+        </p:nvSpPr>
+        <p:spPr>
+          <a:xfrm>
+            <a:off x="1500909" y="568036"/>
+            <a:ext cx="9144000" cy="785236"/>
+          </a:xfrm>
+        </p:spPr>
+        <p:txBody>
+          <a:bodyPr anchor="ctr">
+            <a:normAutofit fontScale="90000"/>
+          </a:bodyPr>
+          <a:lstStyle/>
+          <a:p>
+            <a:r>
+              <a:rPr lang="fr-FR" dirty="0">
+                <a:solidFill>
+                  <a:schemeClr val="bg1"/>
+                </a:solidFill>
+                <a:latin typeface="Alone On Earth" pitchFamily="50" charset="0"/>
+              </a:rPr>
+              <a:t>Analyse fonctionnelle</a:t>
+            </a:r>
+            <a:endParaRPr lang="fr-FR" dirty="0">
+              <a:solidFill>
+                <a:schemeClr val="bg1"/>
+              </a:solidFill>
+              <a:latin typeface="Alone On Earth" pitchFamily="50" charset="0"/>
+            </a:endParaRPr>
+          </a:p>
+        </p:txBody>
+      </p:sp>
+      <p:sp>
+        <p:nvSpPr>
+          <p:cNvPr id="4" name="ZoneTexte 3"/>
+          <p:cNvSpPr txBox="1"/>
+          <p:nvPr/>
+        </p:nvSpPr>
+        <p:spPr>
+          <a:xfrm>
+            <a:off x="8350898" y="57727"/>
+            <a:ext cx="4187466" cy="369332"/>
+          </a:xfrm>
+          <a:prstGeom prst="rect">
+            <a:avLst/>
+          </a:prstGeom>
+          <a:noFill/>
+        </p:spPr>
+        <p:txBody>
+          <a:bodyPr wrap="square" rtlCol="0">
+            <a:spAutoFit/>
+          </a:bodyPr>
+          <a:lstStyle/>
+          <a:p>
+            <a:pPr algn="ctr"/>
+            <a:r>
+              <a:rPr lang="fr-FR" dirty="0">
+                <a:solidFill>
+                  <a:schemeClr val="bg1"/>
+                </a:solidFill>
+                <a:latin typeface="Alone On Earth" pitchFamily="50" charset="0"/>
+              </a:rPr>
+              <a:t>Etudiant 1 : Grégoire Colbert</a:t>
+            </a:r>
+          </a:p>
+        </p:txBody>
+      </p:sp>
+      <p:pic>
+        <p:nvPicPr>
+          <p:cNvPr id="5" name="Picture 6" descr="http://www.la-providence.net/images/vina_erida/logo_providence.jpg"/>
+          <p:cNvPicPr>
+            <a:picLocks noChangeAspect="1" noChangeArrowheads="1"/>
+          </p:cNvPicPr>
+          <p:nvPr/>
+        </p:nvPicPr>
+        <p:blipFill>
+          <a:blip r:embed="rId2">
+            <a:extLst>
+              <a:ext uri="{28A0092B-C50C-407E-A947-70E740481C1C}">
+                <a14:useLocalDpi xmlns:a14="http://schemas.microsoft.com/office/drawing/2010/main" val="0"/>
+              </a:ext>
+            </a:extLst>
+          </a:blip>
+          <a:srcRect/>
+          <a:stretch>
+            <a:fillRect/>
+          </a:stretch>
+        </p:blipFill>
+        <p:spPr bwMode="auto">
+          <a:xfrm>
+            <a:off x="142251" y="57727"/>
+            <a:ext cx="1868632" cy="565507"/>
+          </a:xfrm>
+          <a:prstGeom prst="rect">
+            <a:avLst/>
+          </a:prstGeom>
+          <a:noFill/>
+          <a:effectLst>
+            <a:outerShdw blurRad="50800" dist="38100" dir="8100000" algn="tr" rotWithShape="0">
+              <a:prstClr val="black">
+                <a:alpha val="40000"/>
+              </a:prstClr>
+            </a:outerShdw>
+          </a:effectLst>
+          <a:extLst>
+            <a:ext uri="{909E8E84-426E-40DD-AFC4-6F175D3DCCD1}">
+              <a14:hiddenFill xmlns:a14="http://schemas.microsoft.com/office/drawing/2010/main">
+                <a:solidFill>
+                  <a:srgbClr val="FFFFFF"/>
+                </a:solidFill>
+              </a14:hiddenFill>
+            </a:ext>
+          </a:extLst>
+        </p:spPr>
+      </p:pic>
+      <p:sp>
+        <p:nvSpPr>
+          <p:cNvPr id="6" name="ZoneTexte 5"/>
+          <p:cNvSpPr txBox="1"/>
+          <p:nvPr/>
+        </p:nvSpPr>
+        <p:spPr>
+          <a:xfrm>
+            <a:off x="994610" y="1684421"/>
+            <a:ext cx="8823157" cy="523220"/>
+          </a:xfrm>
+          <a:prstGeom prst="rect">
+            <a:avLst/>
+          </a:prstGeom>
+          <a:noFill/>
+        </p:spPr>
+        <p:txBody>
+          <a:bodyPr wrap="square" rtlCol="0">
+            <a:spAutoFit/>
+          </a:bodyPr>
+          <a:lstStyle/>
+          <a:p>
+            <a:r>
+              <a:rPr lang="fr-FR" sz="2800" dirty="0" smtClean="0">
+                <a:solidFill>
+                  <a:schemeClr val="bg1"/>
+                </a:solidFill>
+              </a:rPr>
+              <a:t>Diagramme de cas d’utilisation personnel détaillé</a:t>
+            </a:r>
+            <a:endParaRPr lang="fr-FR" sz="2800" dirty="0">
+              <a:solidFill>
+                <a:schemeClr val="bg1"/>
+              </a:solidFill>
+            </a:endParaRPr>
+          </a:p>
+        </p:txBody>
+      </p:sp>
+      <p:pic>
+        <p:nvPicPr>
+          <p:cNvPr id="7" name="Image 6"/>
+          <p:cNvPicPr>
+            <a:picLocks noChangeAspect="1"/>
+          </p:cNvPicPr>
+          <p:nvPr/>
+        </p:nvPicPr>
+        <p:blipFill>
+          <a:blip r:embed="rId3">
+            <a:extLst>
+              <a:ext uri="{28A0092B-C50C-407E-A947-70E740481C1C}">
+                <a14:useLocalDpi xmlns:a14="http://schemas.microsoft.com/office/drawing/2010/main" val="0"/>
+              </a:ext>
+            </a:extLst>
+          </a:blip>
+          <a:stretch>
+            <a:fillRect/>
+          </a:stretch>
+        </p:blipFill>
+        <p:spPr>
+          <a:xfrm>
+            <a:off x="1930977" y="2414459"/>
+            <a:ext cx="8283864" cy="4085090"/>
+          </a:xfrm>
+          <a:prstGeom prst="rect">
+            <a:avLst/>
+          </a:prstGeom>
+        </p:spPr>
+      </p:pic>
+    </p:spTree>
+    <p:extLst>
+      <p:ext uri="{BB962C8B-B14F-4D97-AF65-F5344CB8AC3E}">
+        <p14:creationId xmlns:p14="http://schemas.microsoft.com/office/powerpoint/2010/main" val="2050366739"/>
+      </p:ext>
+    </p:extLst>
+  </p:cSld>
+  <p:clrMapOvr>
+    <a:masterClrMapping/>
+  </p:clrMapOvr>
+  <p:timing>
+    <p:tnLst>
+      <p:par>
+        <p:cTn id="1" dur="indefinite" restart="never" nodeType="tmRoot"/>
+      </p:par>
+    </p:tnLst>
+  </p:timing>
+</p:sld>
+</file>
+
+<file path=ppt/slides/slide9.xml><?xml version="1.0" encoding="utf-8"?>
+<p:sld xmlns:a="http://schemas.openxmlformats.org/drawingml/2006/main" xmlns:r="http://schemas.openxmlformats.org/officeDocument/2006/relationships" xmlns:p="http://schemas.openxmlformats.org/presentationml/2006/main">
+  <p:cSld>
+    <p:bg>
+      <p:bgPr>
+        <a:solidFill>
+          <a:srgbClr val="CC3300"/>
+        </a:solidFill>
+        <a:effectLst/>
+      </p:bgPr>
+    </p:bg>
+    <p:spTree>
+      <p:nvGrpSpPr>
+        <p:cNvPr id="1" name=""/>
+        <p:cNvGrpSpPr/>
+        <p:nvPr/>
+      </p:nvGrpSpPr>
+      <p:grpSpPr>
+        <a:xfrm>
+          <a:off x="0" y="0"/>
+          <a:ext cx="0" cy="0"/>
+          <a:chOff x="0" y="0"/>
+          <a:chExt cx="0" cy="0"/>
+        </a:xfrm>
+      </p:grpSpPr>
+      <p:sp>
+        <p:nvSpPr>
+          <p:cNvPr id="2" name="Titre 1"/>
+          <p:cNvSpPr>
+            <a:spLocks noGrp="1"/>
+          </p:cNvSpPr>
+          <p:nvPr>
+            <p:ph type="ctrTitle"/>
+          </p:nvPr>
+        </p:nvSpPr>
+        <p:spPr>
+          <a:xfrm>
+            <a:off x="1500909" y="568036"/>
+            <a:ext cx="9144000" cy="785236"/>
+          </a:xfrm>
+        </p:spPr>
+        <p:txBody>
+          <a:bodyPr anchor="ctr">
+            <a:normAutofit fontScale="90000"/>
+          </a:bodyPr>
+          <a:lstStyle/>
+          <a:p>
+            <a:r>
+              <a:rPr lang="fr-FR" dirty="0" smtClean="0">
+                <a:solidFill>
+                  <a:schemeClr val="bg1"/>
+                </a:solidFill>
+                <a:latin typeface="Alone On Earth" pitchFamily="50" charset="0"/>
+              </a:rPr>
+              <a:t>MCD</a:t>
+            </a:r>
+            <a:endParaRPr lang="fr-FR" dirty="0">
+              <a:solidFill>
+                <a:schemeClr val="bg1"/>
+              </a:solidFill>
+              <a:latin typeface="Alone On Earth" pitchFamily="50" charset="0"/>
+            </a:endParaRPr>
+          </a:p>
+        </p:txBody>
+      </p:sp>
+      <p:sp>
+        <p:nvSpPr>
+          <p:cNvPr id="4" name="ZoneTexte 3"/>
+          <p:cNvSpPr txBox="1"/>
+          <p:nvPr/>
+        </p:nvSpPr>
+        <p:spPr>
+          <a:xfrm>
+            <a:off x="8350898" y="57727"/>
+            <a:ext cx="4187466" cy="369332"/>
+          </a:xfrm>
+          <a:prstGeom prst="rect">
+            <a:avLst/>
+          </a:prstGeom>
+          <a:noFill/>
+        </p:spPr>
+        <p:txBody>
+          <a:bodyPr wrap="square" rtlCol="0">
+            <a:spAutoFit/>
+          </a:bodyPr>
+          <a:lstStyle/>
+          <a:p>
+            <a:pPr algn="ctr"/>
+            <a:r>
+              <a:rPr lang="fr-FR" dirty="0">
+                <a:solidFill>
+                  <a:schemeClr val="bg1"/>
+                </a:solidFill>
+                <a:latin typeface="Alone On Earth" pitchFamily="50" charset="0"/>
+              </a:rPr>
+              <a:t>Etudiant 1 : Grégoire Colbert</a:t>
+            </a:r>
+          </a:p>
+        </p:txBody>
+      </p:sp>
+      <p:pic>
+        <p:nvPicPr>
+          <p:cNvPr id="5" name="Picture 6" descr="http://www.la-providence.net/images/vina_erida/logo_providence.jpg"/>
+          <p:cNvPicPr>
+            <a:picLocks noChangeAspect="1" noChangeArrowheads="1"/>
+          </p:cNvPicPr>
+          <p:nvPr/>
+        </p:nvPicPr>
+        <p:blipFill>
+          <a:blip r:embed="rId2">
+            <a:extLst>
+              <a:ext uri="{28A0092B-C50C-407E-A947-70E740481C1C}">
+                <a14:useLocalDpi xmlns:a14="http://schemas.microsoft.com/office/drawing/2010/main" val="0"/>
+              </a:ext>
+            </a:extLst>
+          </a:blip>
+          <a:srcRect/>
+          <a:stretch>
+            <a:fillRect/>
+          </a:stretch>
+        </p:blipFill>
+        <p:spPr bwMode="auto">
+          <a:xfrm>
+            <a:off x="142251" y="57727"/>
+            <a:ext cx="1868632" cy="565507"/>
+          </a:xfrm>
+          <a:prstGeom prst="rect">
+            <a:avLst/>
+          </a:prstGeom>
+          <a:noFill/>
+          <a:effectLst>
+            <a:outerShdw blurRad="50800" dist="38100" dir="8100000" algn="tr" rotWithShape="0">
+              <a:prstClr val="black">
+                <a:alpha val="40000"/>
+              </a:prstClr>
+            </a:outerShdw>
+          </a:effectLst>
+          <a:extLst>
+            <a:ext uri="{909E8E84-426E-40DD-AFC4-6F175D3DCCD1}">
+              <a14:hiddenFill xmlns:a14="http://schemas.microsoft.com/office/drawing/2010/main">
+                <a:solidFill>
+                  <a:srgbClr val="FFFFFF"/>
+                </a:solidFill>
+              </a14:hiddenFill>
+            </a:ext>
+          </a:extLst>
+        </p:spPr>
+      </p:pic>
+      <p:pic>
+        <p:nvPicPr>
+          <p:cNvPr id="3" name="Image 2"/>
+          <p:cNvPicPr>
+            <a:picLocks noChangeAspect="1"/>
+          </p:cNvPicPr>
+          <p:nvPr/>
+        </p:nvPicPr>
+        <p:blipFill>
+          <a:blip r:embed="rId3">
+            <a:extLst>
+              <a:ext uri="{28A0092B-C50C-407E-A947-70E740481C1C}">
+                <a14:useLocalDpi xmlns:a14="http://schemas.microsoft.com/office/drawing/2010/main" val="0"/>
+              </a:ext>
+            </a:extLst>
+          </a:blip>
+          <a:stretch>
+            <a:fillRect/>
+          </a:stretch>
+        </p:blipFill>
+        <p:spPr>
+          <a:xfrm>
+            <a:off x="2141465" y="1711181"/>
+            <a:ext cx="7862888" cy="4608494"/>
+          </a:xfrm>
+          <a:prstGeom prst="rect">
+            <a:avLst/>
+          </a:prstGeom>
+        </p:spPr>
+      </p:pic>
+    </p:spTree>
+    <p:extLst>
+      <p:ext uri="{BB962C8B-B14F-4D97-AF65-F5344CB8AC3E}">
+        <p14:creationId xmlns:p14="http://schemas.microsoft.com/office/powerpoint/2010/main" val="1070737783"/>
       </p:ext>
     </p:extLst>
   </p:cSld>

</xml_diff>

<commit_message>
maj diag classe/mcd/bdd et powerpoint revue 1
</commit_message>
<xml_diff>
--- a/Ressources/Presentation_Projet_CrossLaPro_E1_Colbert.pptx
+++ b/Ressources/Presentation_Projet_CrossLaPro_E1_Colbert.pptx
@@ -280,38 +280,37 @@
           <a:p>
             <a:pPr lvl="0"/>
             <a:r>
-              <a:rPr lang="fr-FR" smtClean="0"/>
+              <a:rPr lang="fr-FR"/>
               <a:t>Modifier les styles du texte du masque</a:t>
             </a:r>
           </a:p>
           <a:p>
             <a:pPr lvl="1"/>
             <a:r>
-              <a:rPr lang="fr-FR" smtClean="0"/>
+              <a:rPr lang="fr-FR"/>
               <a:t>Deuxième niveau</a:t>
             </a:r>
           </a:p>
           <a:p>
             <a:pPr lvl="2"/>
             <a:r>
-              <a:rPr lang="fr-FR" smtClean="0"/>
+              <a:rPr lang="fr-FR"/>
               <a:t>Troisième niveau</a:t>
             </a:r>
           </a:p>
           <a:p>
             <a:pPr lvl="3"/>
             <a:r>
-              <a:rPr lang="fr-FR" smtClean="0"/>
+              <a:rPr lang="fr-FR"/>
               <a:t>Quatrième niveau</a:t>
             </a:r>
           </a:p>
           <a:p>
             <a:pPr lvl="4"/>
             <a:r>
-              <a:rPr lang="fr-FR" smtClean="0"/>
+              <a:rPr lang="fr-FR"/>
               <a:t>Cinquième niveau</a:t>
             </a:r>
-            <a:endParaRPr lang="fr-FR"/>
           </a:p>
         </p:txBody>
       </p:sp>
@@ -610,10 +609,9 @@
           </a:lstStyle>
           <a:p>
             <a:r>
-              <a:rPr lang="fr-FR" smtClean="0"/>
+              <a:rPr lang="fr-FR"/>
               <a:t>Modifiez le style du titre</a:t>
             </a:r>
-            <a:endParaRPr lang="fr-FR"/>
           </a:p>
         </p:txBody>
       </p:sp>
@@ -675,10 +673,9 @@
           </a:lstStyle>
           <a:p>
             <a:r>
-              <a:rPr lang="fr-FR" smtClean="0"/>
+              <a:rPr lang="fr-FR"/>
               <a:t>Modifier le style des sous-titres du masque</a:t>
             </a:r>
-            <a:endParaRPr lang="fr-FR"/>
           </a:p>
         </p:txBody>
       </p:sp>
@@ -793,10 +790,9 @@
           <a:lstStyle/>
           <a:p>
             <a:r>
-              <a:rPr lang="fr-FR" smtClean="0"/>
+              <a:rPr lang="fr-FR"/>
               <a:t>Modifiez le style du titre</a:t>
             </a:r>
-            <a:endParaRPr lang="fr-FR"/>
           </a:p>
         </p:txBody>
       </p:sp>
@@ -817,38 +813,37 @@
           <a:p>
             <a:pPr lvl="0"/>
             <a:r>
-              <a:rPr lang="fr-FR" smtClean="0"/>
+              <a:rPr lang="fr-FR"/>
               <a:t>Modifier les styles du texte du masque</a:t>
             </a:r>
           </a:p>
           <a:p>
             <a:pPr lvl="1"/>
             <a:r>
-              <a:rPr lang="fr-FR" smtClean="0"/>
+              <a:rPr lang="fr-FR"/>
               <a:t>Deuxième niveau</a:t>
             </a:r>
           </a:p>
           <a:p>
             <a:pPr lvl="2"/>
             <a:r>
-              <a:rPr lang="fr-FR" smtClean="0"/>
+              <a:rPr lang="fr-FR"/>
               <a:t>Troisième niveau</a:t>
             </a:r>
           </a:p>
           <a:p>
             <a:pPr lvl="3"/>
             <a:r>
-              <a:rPr lang="fr-FR" smtClean="0"/>
+              <a:rPr lang="fr-FR"/>
               <a:t>Quatrième niveau</a:t>
             </a:r>
           </a:p>
           <a:p>
             <a:pPr lvl="4"/>
             <a:r>
-              <a:rPr lang="fr-FR" smtClean="0"/>
+              <a:rPr lang="fr-FR"/>
               <a:t>Cinquième niveau</a:t>
             </a:r>
-            <a:endParaRPr lang="fr-FR"/>
           </a:p>
         </p:txBody>
       </p:sp>
@@ -968,10 +963,9 @@
           <a:lstStyle/>
           <a:p>
             <a:r>
-              <a:rPr lang="fr-FR" smtClean="0"/>
+              <a:rPr lang="fr-FR"/>
               <a:t>Modifiez le style du titre</a:t>
             </a:r>
-            <a:endParaRPr lang="fr-FR"/>
           </a:p>
         </p:txBody>
       </p:sp>
@@ -997,38 +991,37 @@
           <a:p>
             <a:pPr lvl="0"/>
             <a:r>
-              <a:rPr lang="fr-FR" smtClean="0"/>
+              <a:rPr lang="fr-FR"/>
               <a:t>Modifier les styles du texte du masque</a:t>
             </a:r>
           </a:p>
           <a:p>
             <a:pPr lvl="1"/>
             <a:r>
-              <a:rPr lang="fr-FR" smtClean="0"/>
+              <a:rPr lang="fr-FR"/>
               <a:t>Deuxième niveau</a:t>
             </a:r>
           </a:p>
           <a:p>
             <a:pPr lvl="2"/>
             <a:r>
-              <a:rPr lang="fr-FR" smtClean="0"/>
+              <a:rPr lang="fr-FR"/>
               <a:t>Troisième niveau</a:t>
             </a:r>
           </a:p>
           <a:p>
             <a:pPr lvl="3"/>
             <a:r>
-              <a:rPr lang="fr-FR" smtClean="0"/>
+              <a:rPr lang="fr-FR"/>
               <a:t>Quatrième niveau</a:t>
             </a:r>
           </a:p>
           <a:p>
             <a:pPr lvl="4"/>
             <a:r>
-              <a:rPr lang="fr-FR" smtClean="0"/>
+              <a:rPr lang="fr-FR"/>
               <a:t>Cinquième niveau</a:t>
             </a:r>
-            <a:endParaRPr lang="fr-FR"/>
           </a:p>
         </p:txBody>
       </p:sp>
@@ -1143,10 +1136,9 @@
           <a:lstStyle/>
           <a:p>
             <a:r>
-              <a:rPr lang="fr-FR" smtClean="0"/>
+              <a:rPr lang="fr-FR"/>
               <a:t>Modifiez le style du titre</a:t>
             </a:r>
-            <a:endParaRPr lang="fr-FR"/>
           </a:p>
         </p:txBody>
       </p:sp>
@@ -1167,38 +1159,37 @@
           <a:p>
             <a:pPr lvl="0"/>
             <a:r>
-              <a:rPr lang="fr-FR" smtClean="0"/>
+              <a:rPr lang="fr-FR"/>
               <a:t>Modifier les styles du texte du masque</a:t>
             </a:r>
           </a:p>
           <a:p>
             <a:pPr lvl="1"/>
             <a:r>
-              <a:rPr lang="fr-FR" smtClean="0"/>
+              <a:rPr lang="fr-FR"/>
               <a:t>Deuxième niveau</a:t>
             </a:r>
           </a:p>
           <a:p>
             <a:pPr lvl="2"/>
             <a:r>
-              <a:rPr lang="fr-FR" smtClean="0"/>
+              <a:rPr lang="fr-FR"/>
               <a:t>Troisième niveau</a:t>
             </a:r>
           </a:p>
           <a:p>
             <a:pPr lvl="3"/>
             <a:r>
-              <a:rPr lang="fr-FR" smtClean="0"/>
+              <a:rPr lang="fr-FR"/>
               <a:t>Quatrième niveau</a:t>
             </a:r>
           </a:p>
           <a:p>
             <a:pPr lvl="4"/>
             <a:r>
-              <a:rPr lang="fr-FR" smtClean="0"/>
+              <a:rPr lang="fr-FR"/>
               <a:t>Cinquième niveau</a:t>
             </a:r>
-            <a:endParaRPr lang="fr-FR"/>
           </a:p>
         </p:txBody>
       </p:sp>
@@ -1322,10 +1313,9 @@
           </a:lstStyle>
           <a:p>
             <a:r>
-              <a:rPr lang="fr-FR" smtClean="0"/>
+              <a:rPr lang="fr-FR"/>
               <a:t>Modifiez le style du titre</a:t>
             </a:r>
-            <a:endParaRPr lang="fr-FR"/>
           </a:p>
         </p:txBody>
       </p:sp>
@@ -1442,7 +1432,7 @@
           <a:p>
             <a:pPr lvl="0"/>
             <a:r>
-              <a:rPr lang="fr-FR" smtClean="0"/>
+              <a:rPr lang="fr-FR"/>
               <a:t>Modifier les styles du texte du masque</a:t>
             </a:r>
           </a:p>
@@ -1559,10 +1549,9 @@
           <a:lstStyle/>
           <a:p>
             <a:r>
-              <a:rPr lang="fr-FR" smtClean="0"/>
+              <a:rPr lang="fr-FR"/>
               <a:t>Modifiez le style du titre</a:t>
             </a:r>
-            <a:endParaRPr lang="fr-FR"/>
           </a:p>
         </p:txBody>
       </p:sp>
@@ -1588,38 +1577,37 @@
           <a:p>
             <a:pPr lvl="0"/>
             <a:r>
-              <a:rPr lang="fr-FR" smtClean="0"/>
+              <a:rPr lang="fr-FR"/>
               <a:t>Modifier les styles du texte du masque</a:t>
             </a:r>
           </a:p>
           <a:p>
             <a:pPr lvl="1"/>
             <a:r>
-              <a:rPr lang="fr-FR" smtClean="0"/>
+              <a:rPr lang="fr-FR"/>
               <a:t>Deuxième niveau</a:t>
             </a:r>
           </a:p>
           <a:p>
             <a:pPr lvl="2"/>
             <a:r>
-              <a:rPr lang="fr-FR" smtClean="0"/>
+              <a:rPr lang="fr-FR"/>
               <a:t>Troisième niveau</a:t>
             </a:r>
           </a:p>
           <a:p>
             <a:pPr lvl="3"/>
             <a:r>
-              <a:rPr lang="fr-FR" smtClean="0"/>
+              <a:rPr lang="fr-FR"/>
               <a:t>Quatrième niveau</a:t>
             </a:r>
           </a:p>
           <a:p>
             <a:pPr lvl="4"/>
             <a:r>
-              <a:rPr lang="fr-FR" smtClean="0"/>
+              <a:rPr lang="fr-FR"/>
               <a:t>Cinquième niveau</a:t>
             </a:r>
-            <a:endParaRPr lang="fr-FR"/>
           </a:p>
         </p:txBody>
       </p:sp>
@@ -1645,38 +1633,37 @@
           <a:p>
             <a:pPr lvl="0"/>
             <a:r>
-              <a:rPr lang="fr-FR" smtClean="0"/>
+              <a:rPr lang="fr-FR"/>
               <a:t>Modifier les styles du texte du masque</a:t>
             </a:r>
           </a:p>
           <a:p>
             <a:pPr lvl="1"/>
             <a:r>
-              <a:rPr lang="fr-FR" smtClean="0"/>
+              <a:rPr lang="fr-FR"/>
               <a:t>Deuxième niveau</a:t>
             </a:r>
           </a:p>
           <a:p>
             <a:pPr lvl="2"/>
             <a:r>
-              <a:rPr lang="fr-FR" smtClean="0"/>
+              <a:rPr lang="fr-FR"/>
               <a:t>Troisième niveau</a:t>
             </a:r>
           </a:p>
           <a:p>
             <a:pPr lvl="3"/>
             <a:r>
-              <a:rPr lang="fr-FR" smtClean="0"/>
+              <a:rPr lang="fr-FR"/>
               <a:t>Quatrième niveau</a:t>
             </a:r>
           </a:p>
           <a:p>
             <a:pPr lvl="4"/>
             <a:r>
-              <a:rPr lang="fr-FR" smtClean="0"/>
+              <a:rPr lang="fr-FR"/>
               <a:t>Cinquième niveau</a:t>
             </a:r>
-            <a:endParaRPr lang="fr-FR"/>
           </a:p>
         </p:txBody>
       </p:sp>
@@ -1796,10 +1783,9 @@
           <a:lstStyle/>
           <a:p>
             <a:r>
-              <a:rPr lang="fr-FR" smtClean="0"/>
+              <a:rPr lang="fr-FR"/>
               <a:t>Modifiez le style du titre</a:t>
             </a:r>
-            <a:endParaRPr lang="fr-FR"/>
           </a:p>
         </p:txBody>
       </p:sp>
@@ -1862,7 +1848,7 @@
           <a:p>
             <a:pPr lvl="0"/>
             <a:r>
-              <a:rPr lang="fr-FR" smtClean="0"/>
+              <a:rPr lang="fr-FR"/>
               <a:t>Modifier les styles du texte du masque</a:t>
             </a:r>
           </a:p>
@@ -1890,38 +1876,37 @@
           <a:p>
             <a:pPr lvl="0"/>
             <a:r>
-              <a:rPr lang="fr-FR" smtClean="0"/>
+              <a:rPr lang="fr-FR"/>
               <a:t>Modifier les styles du texte du masque</a:t>
             </a:r>
           </a:p>
           <a:p>
             <a:pPr lvl="1"/>
             <a:r>
-              <a:rPr lang="fr-FR" smtClean="0"/>
+              <a:rPr lang="fr-FR"/>
               <a:t>Deuxième niveau</a:t>
             </a:r>
           </a:p>
           <a:p>
             <a:pPr lvl="2"/>
             <a:r>
-              <a:rPr lang="fr-FR" smtClean="0"/>
+              <a:rPr lang="fr-FR"/>
               <a:t>Troisième niveau</a:t>
             </a:r>
           </a:p>
           <a:p>
             <a:pPr lvl="3"/>
             <a:r>
-              <a:rPr lang="fr-FR" smtClean="0"/>
+              <a:rPr lang="fr-FR"/>
               <a:t>Quatrième niveau</a:t>
             </a:r>
           </a:p>
           <a:p>
             <a:pPr lvl="4"/>
             <a:r>
-              <a:rPr lang="fr-FR" smtClean="0"/>
+              <a:rPr lang="fr-FR"/>
               <a:t>Cinquième niveau</a:t>
             </a:r>
-            <a:endParaRPr lang="fr-FR"/>
           </a:p>
         </p:txBody>
       </p:sp>
@@ -1984,7 +1969,7 @@
           <a:p>
             <a:pPr lvl="0"/>
             <a:r>
-              <a:rPr lang="fr-FR" smtClean="0"/>
+              <a:rPr lang="fr-FR"/>
               <a:t>Modifier les styles du texte du masque</a:t>
             </a:r>
           </a:p>
@@ -2012,38 +1997,37 @@
           <a:p>
             <a:pPr lvl="0"/>
             <a:r>
-              <a:rPr lang="fr-FR" smtClean="0"/>
+              <a:rPr lang="fr-FR"/>
               <a:t>Modifier les styles du texte du masque</a:t>
             </a:r>
           </a:p>
           <a:p>
             <a:pPr lvl="1"/>
             <a:r>
-              <a:rPr lang="fr-FR" smtClean="0"/>
+              <a:rPr lang="fr-FR"/>
               <a:t>Deuxième niveau</a:t>
             </a:r>
           </a:p>
           <a:p>
             <a:pPr lvl="2"/>
             <a:r>
-              <a:rPr lang="fr-FR" smtClean="0"/>
+              <a:rPr lang="fr-FR"/>
               <a:t>Troisième niveau</a:t>
             </a:r>
           </a:p>
           <a:p>
             <a:pPr lvl="3"/>
             <a:r>
-              <a:rPr lang="fr-FR" smtClean="0"/>
+              <a:rPr lang="fr-FR"/>
               <a:t>Quatrième niveau</a:t>
             </a:r>
           </a:p>
           <a:p>
             <a:pPr lvl="4"/>
             <a:r>
-              <a:rPr lang="fr-FR" smtClean="0"/>
+              <a:rPr lang="fr-FR"/>
               <a:t>Cinquième niveau</a:t>
             </a:r>
-            <a:endParaRPr lang="fr-FR"/>
           </a:p>
         </p:txBody>
       </p:sp>
@@ -2158,10 +2142,9 @@
           <a:lstStyle/>
           <a:p>
             <a:r>
-              <a:rPr lang="fr-FR" smtClean="0"/>
+              <a:rPr lang="fr-FR"/>
               <a:t>Modifiez le style du titre</a:t>
             </a:r>
-            <a:endParaRPr lang="fr-FR"/>
           </a:p>
         </p:txBody>
       </p:sp>
@@ -2380,10 +2363,9 @@
           </a:lstStyle>
           <a:p>
             <a:r>
-              <a:rPr lang="fr-FR" smtClean="0"/>
+              <a:rPr lang="fr-FR"/>
               <a:t>Modifiez le style du titre</a:t>
             </a:r>
-            <a:endParaRPr lang="fr-FR"/>
           </a:p>
         </p:txBody>
       </p:sp>
@@ -2437,38 +2419,37 @@
           <a:p>
             <a:pPr lvl="0"/>
             <a:r>
-              <a:rPr lang="fr-FR" smtClean="0"/>
+              <a:rPr lang="fr-FR"/>
               <a:t>Modifier les styles du texte du masque</a:t>
             </a:r>
           </a:p>
           <a:p>
             <a:pPr lvl="1"/>
             <a:r>
-              <a:rPr lang="fr-FR" smtClean="0"/>
+              <a:rPr lang="fr-FR"/>
               <a:t>Deuxième niveau</a:t>
             </a:r>
           </a:p>
           <a:p>
             <a:pPr lvl="2"/>
             <a:r>
-              <a:rPr lang="fr-FR" smtClean="0"/>
+              <a:rPr lang="fr-FR"/>
               <a:t>Troisième niveau</a:t>
             </a:r>
           </a:p>
           <a:p>
             <a:pPr lvl="3"/>
             <a:r>
-              <a:rPr lang="fr-FR" smtClean="0"/>
+              <a:rPr lang="fr-FR"/>
               <a:t>Quatrième niveau</a:t>
             </a:r>
           </a:p>
           <a:p>
             <a:pPr lvl="4"/>
             <a:r>
-              <a:rPr lang="fr-FR" smtClean="0"/>
+              <a:rPr lang="fr-FR"/>
               <a:t>Cinquième niveau</a:t>
             </a:r>
-            <a:endParaRPr lang="fr-FR"/>
           </a:p>
         </p:txBody>
       </p:sp>
@@ -2531,7 +2512,7 @@
           <a:p>
             <a:pPr lvl="0"/>
             <a:r>
-              <a:rPr lang="fr-FR" smtClean="0"/>
+              <a:rPr lang="fr-FR"/>
               <a:t>Modifier les styles du texte du masque</a:t>
             </a:r>
           </a:p>
@@ -2657,10 +2638,9 @@
           </a:lstStyle>
           <a:p>
             <a:r>
-              <a:rPr lang="fr-FR" smtClean="0"/>
+              <a:rPr lang="fr-FR"/>
               <a:t>Modifiez le style du titre</a:t>
             </a:r>
-            <a:endParaRPr lang="fr-FR"/>
           </a:p>
         </p:txBody>
       </p:sp>
@@ -2784,7 +2764,7 @@
           <a:p>
             <a:pPr lvl="0"/>
             <a:r>
-              <a:rPr lang="fr-FR" smtClean="0"/>
+              <a:rPr lang="fr-FR"/>
               <a:t>Modifier les styles du texte du masque</a:t>
             </a:r>
           </a:p>
@@ -2916,10 +2896,9 @@
           <a:lstStyle/>
           <a:p>
             <a:r>
-              <a:rPr lang="fr-FR" smtClean="0"/>
+              <a:rPr lang="fr-FR"/>
               <a:t>Modifiez le style du titre</a:t>
             </a:r>
-            <a:endParaRPr lang="fr-FR"/>
           </a:p>
         </p:txBody>
       </p:sp>
@@ -2950,38 +2929,37 @@
           <a:p>
             <a:pPr lvl="0"/>
             <a:r>
-              <a:rPr lang="fr-FR" smtClean="0"/>
+              <a:rPr lang="fr-FR"/>
               <a:t>Modifier les styles du texte du masque</a:t>
             </a:r>
           </a:p>
           <a:p>
             <a:pPr lvl="1"/>
             <a:r>
-              <a:rPr lang="fr-FR" smtClean="0"/>
+              <a:rPr lang="fr-FR"/>
               <a:t>Deuxième niveau</a:t>
             </a:r>
           </a:p>
           <a:p>
             <a:pPr lvl="2"/>
             <a:r>
-              <a:rPr lang="fr-FR" smtClean="0"/>
+              <a:rPr lang="fr-FR"/>
               <a:t>Troisième niveau</a:t>
             </a:r>
           </a:p>
           <a:p>
             <a:pPr lvl="3"/>
             <a:r>
-              <a:rPr lang="fr-FR" smtClean="0"/>
+              <a:rPr lang="fr-FR"/>
               <a:t>Quatrième niveau</a:t>
             </a:r>
           </a:p>
           <a:p>
             <a:pPr lvl="4"/>
             <a:r>
-              <a:rPr lang="fr-FR" smtClean="0"/>
+              <a:rPr lang="fr-FR"/>
               <a:t>Cinquième niveau</a:t>
             </a:r>
-            <a:endParaRPr lang="fr-FR"/>
           </a:p>
         </p:txBody>
       </p:sp>
@@ -3456,7 +3434,7 @@
           <a:lstStyle/>
           <a:p>
             <a:r>
-              <a:rPr lang="fr-FR" dirty="0" smtClean="0">
+              <a:rPr lang="fr-FR" dirty="0">
                 <a:solidFill>
                   <a:schemeClr val="bg1"/>
                 </a:solidFill>
@@ -3464,12 +3442,6 @@
               </a:rPr>
               <a:t>Projet « Cross La Pro »</a:t>
             </a:r>
-            <a:endParaRPr lang="fr-FR" dirty="0">
-              <a:solidFill>
-                <a:schemeClr val="bg1"/>
-              </a:solidFill>
-              <a:latin typeface="Alone On Earth" pitchFamily="50" charset="0"/>
-            </a:endParaRPr>
           </a:p>
         </p:txBody>
       </p:sp>
@@ -3497,7 +3469,7 @@
           <a:p>
             <a:pPr algn="ctr"/>
             <a:r>
-              <a:rPr lang="fr-FR" dirty="0" smtClean="0">
+              <a:rPr lang="fr-FR" dirty="0">
                 <a:solidFill>
                   <a:schemeClr val="bg1"/>
                 </a:solidFill>
@@ -3559,13 +3531,6 @@
   <p:clrMapOvr>
     <a:masterClrMapping/>
   </p:clrMapOvr>
-  <p:timing>
-    <p:tnLst>
-      <p:par>
-        <p:cTn id="1" dur="indefinite" restart="never" nodeType="tmRoot"/>
-      </p:par>
-    </p:tnLst>
-  </p:timing>
 </p:sld>
 </file>
 
@@ -3617,7 +3582,7 @@
           <a:lstStyle/>
           <a:p>
             <a:r>
-              <a:rPr lang="fr-FR" dirty="0" smtClean="0">
+              <a:rPr lang="fr-FR" dirty="0">
                 <a:solidFill>
                   <a:schemeClr val="bg1"/>
                 </a:solidFill>
@@ -3625,12 +3590,6 @@
               </a:rPr>
               <a:t>Connexion/Inscription au site</a:t>
             </a:r>
-            <a:endParaRPr lang="fr-FR" dirty="0">
-              <a:solidFill>
-                <a:schemeClr val="bg1"/>
-              </a:solidFill>
-              <a:latin typeface="Alone On Earth" pitchFamily="50" charset="0"/>
-            </a:endParaRPr>
           </a:p>
         </p:txBody>
       </p:sp>
@@ -3781,13 +3740,6 @@
   <p:clrMapOvr>
     <a:masterClrMapping/>
   </p:clrMapOvr>
-  <p:timing>
-    <p:tnLst>
-      <p:par>
-        <p:cTn id="1" dur="indefinite" restart="never" nodeType="tmRoot"/>
-      </p:par>
-    </p:tnLst>
-  </p:timing>
 </p:sld>
 </file>
 
@@ -3839,7 +3791,7 @@
           <a:lstStyle/>
           <a:p>
             <a:r>
-              <a:rPr lang="fr-FR" dirty="0" smtClean="0">
+              <a:rPr lang="fr-FR" dirty="0">
                 <a:solidFill>
                   <a:schemeClr val="bg1"/>
                 </a:solidFill>
@@ -3847,12 +3799,6 @@
               </a:rPr>
               <a:t>Création d’une Course</a:t>
             </a:r>
-            <a:endParaRPr lang="fr-FR" dirty="0">
-              <a:solidFill>
-                <a:schemeClr val="bg1"/>
-              </a:solidFill>
-              <a:latin typeface="Alone On Earth" pitchFamily="50" charset="0"/>
-            </a:endParaRPr>
           </a:p>
         </p:txBody>
       </p:sp>
@@ -4003,13 +3949,6 @@
   <p:clrMapOvr>
     <a:masterClrMapping/>
   </p:clrMapOvr>
-  <p:timing>
-    <p:tnLst>
-      <p:par>
-        <p:cTn id="1" dur="indefinite" restart="never" nodeType="tmRoot"/>
-      </p:par>
-    </p:tnLst>
-  </p:timing>
 </p:sld>
 </file>
 
@@ -4061,7 +4000,7 @@
           <a:lstStyle/>
           <a:p>
             <a:r>
-              <a:rPr lang="fr-FR" dirty="0" smtClean="0">
+              <a:rPr lang="fr-FR" dirty="0">
                 <a:solidFill>
                   <a:schemeClr val="bg1"/>
                 </a:solidFill>
@@ -4069,12 +4008,6 @@
               </a:rPr>
               <a:t>Inscription à une course</a:t>
             </a:r>
-            <a:endParaRPr lang="fr-FR" dirty="0">
-              <a:solidFill>
-                <a:schemeClr val="bg1"/>
-              </a:solidFill>
-              <a:latin typeface="Alone On Earth" pitchFamily="50" charset="0"/>
-            </a:endParaRPr>
           </a:p>
         </p:txBody>
       </p:sp>
@@ -4225,13 +4158,6 @@
   <p:clrMapOvr>
     <a:masterClrMapping/>
   </p:clrMapOvr>
-  <p:timing>
-    <p:tnLst>
-      <p:par>
-        <p:cTn id="1" dur="indefinite" restart="never" nodeType="tmRoot"/>
-      </p:par>
-    </p:tnLst>
-  </p:timing>
 </p:sld>
 </file>
 
@@ -4283,7 +4209,7 @@
           <a:lstStyle/>
           <a:p>
             <a:r>
-              <a:rPr lang="fr-FR" dirty="0" smtClean="0">
+              <a:rPr lang="fr-FR" dirty="0">
                 <a:solidFill>
                   <a:schemeClr val="bg1"/>
                 </a:solidFill>
@@ -4291,12 +4217,6 @@
               </a:rPr>
               <a:t>Gérer la course</a:t>
             </a:r>
-            <a:endParaRPr lang="fr-FR" dirty="0">
-              <a:solidFill>
-                <a:schemeClr val="bg1"/>
-              </a:solidFill>
-              <a:latin typeface="Alone On Earth" pitchFamily="50" charset="0"/>
-            </a:endParaRPr>
           </a:p>
         </p:txBody>
       </p:sp>
@@ -4447,13 +4367,6 @@
   <p:clrMapOvr>
     <a:masterClrMapping/>
   </p:clrMapOvr>
-  <p:timing>
-    <p:tnLst>
-      <p:par>
-        <p:cTn id="1" dur="indefinite" restart="never" nodeType="tmRoot"/>
-      </p:par>
-    </p:tnLst>
-  </p:timing>
 </p:sld>
 </file>
 
@@ -4505,7 +4418,7 @@
           <a:lstStyle/>
           <a:p>
             <a:r>
-              <a:rPr lang="fr-FR" dirty="0" smtClean="0">
+              <a:rPr lang="fr-FR" dirty="0">
                 <a:solidFill>
                   <a:schemeClr val="bg1"/>
                 </a:solidFill>
@@ -4513,12 +4426,6 @@
               </a:rPr>
               <a:t>Association Coureur Dossard</a:t>
             </a:r>
-            <a:endParaRPr lang="fr-FR" dirty="0">
-              <a:solidFill>
-                <a:schemeClr val="bg1"/>
-              </a:solidFill>
-              <a:latin typeface="Alone On Earth" pitchFamily="50" charset="0"/>
-            </a:endParaRPr>
           </a:p>
         </p:txBody>
       </p:sp>
@@ -4669,13 +4576,6 @@
   <p:clrMapOvr>
     <a:masterClrMapping/>
   </p:clrMapOvr>
-  <p:timing>
-    <p:tnLst>
-      <p:par>
-        <p:cTn id="1" dur="indefinite" restart="never" nodeType="tmRoot"/>
-      </p:par>
-    </p:tnLst>
-  </p:timing>
 </p:sld>
 </file>
 
@@ -4727,20 +4627,14 @@
           <a:lstStyle/>
           <a:p>
             <a:r>
-              <a:rPr lang="fr-FR" dirty="0" smtClean="0">
+              <a:rPr lang="fr-FR" dirty="0">
                 <a:solidFill>
                   <a:schemeClr val="bg1"/>
                 </a:solidFill>
                 <a:latin typeface="Alone On Earth" pitchFamily="50" charset="0"/>
               </a:rPr>
-              <a:t>Distance d’un tour</a:t>
-            </a:r>
-            <a:endParaRPr lang="fr-FR" dirty="0">
-              <a:solidFill>
-                <a:schemeClr val="bg1"/>
-              </a:solidFill>
-              <a:latin typeface="Alone On Earth" pitchFamily="50" charset="0"/>
-            </a:endParaRPr>
+              <a:t>Diagramme de classe</a:t>
+            </a:r>
           </a:p>
         </p:txBody>
       </p:sp>
@@ -4829,22 +4723,34 @@
       </p:pic>
       <p:pic>
         <p:nvPicPr>
-          <p:cNvPr id="6" name="Image 5"/>
+          <p:cNvPr id="7" name="Image 6">
+            <a:extLst>
+              <a:ext uri="{FF2B5EF4-FFF2-40B4-BE49-F238E27FC236}">
+                <a16:creationId xmlns:a16="http://schemas.microsoft.com/office/drawing/2014/main" id="{84C71E8E-4EAE-44BC-B632-CA437CE3BD8D}"/>
+              </a:ext>
+            </a:extLst>
+          </p:cNvPr>
           <p:cNvPicPr>
             <a:picLocks noChangeAspect="1"/>
           </p:cNvPicPr>
           <p:nvPr/>
         </p:nvPicPr>
         <p:blipFill>
-          <a:blip r:embed="rId3"/>
+          <a:blip r:embed="rId3">
+            <a:extLst>
+              <a:ext uri="{28A0092B-C50C-407E-A947-70E740481C1C}">
+                <a14:useLocalDpi xmlns:a14="http://schemas.microsoft.com/office/drawing/2010/main" val="0"/>
+              </a:ext>
+            </a:extLst>
+          </a:blip>
           <a:stretch>
             <a:fillRect/>
           </a:stretch>
         </p:blipFill>
         <p:spPr>
           <a:xfrm>
-            <a:off x="245348" y="1742642"/>
-            <a:ext cx="3099269" cy="763588"/>
+            <a:off x="4028189" y="1655033"/>
+            <a:ext cx="4135622" cy="4994419"/>
           </a:xfrm>
           <a:prstGeom prst="rect">
             <a:avLst/>
@@ -4861,13 +4767,6 @@
   <p:clrMapOvr>
     <a:masterClrMapping/>
   </p:clrMapOvr>
-  <p:timing>
-    <p:tnLst>
-      <p:par>
-        <p:cTn id="1" dur="indefinite" restart="never" nodeType="tmRoot"/>
-      </p:par>
-    </p:tnLst>
-  </p:timing>
 </p:sld>
 </file>
 
@@ -4919,20 +4818,14 @@
           <a:lstStyle/>
           <a:p>
             <a:r>
-              <a:rPr lang="fr-FR" dirty="0" smtClean="0">
+              <a:rPr lang="fr-FR" dirty="0">
                 <a:solidFill>
                   <a:schemeClr val="bg1"/>
                 </a:solidFill>
                 <a:latin typeface="Alone On Earth" pitchFamily="50" charset="0"/>
               </a:rPr>
-              <a:t>Organisation du projet</a:t>
-            </a:r>
-            <a:endParaRPr lang="fr-FR" dirty="0">
-              <a:solidFill>
-                <a:schemeClr val="bg1"/>
-              </a:solidFill>
-              <a:latin typeface="Alone On Earth" pitchFamily="50" charset="0"/>
-            </a:endParaRPr>
+              <a:t>Diagramme de classe</a:t>
+            </a:r>
           </a:p>
         </p:txBody>
       </p:sp>
@@ -5029,13 +4922,6 @@
   <p:clrMapOvr>
     <a:masterClrMapping/>
   </p:clrMapOvr>
-  <p:timing>
-    <p:tnLst>
-      <p:par>
-        <p:cTn id="1" dur="indefinite" restart="never" nodeType="tmRoot"/>
-      </p:par>
-    </p:tnLst>
-  </p:timing>
 </p:sld>
 </file>
 
@@ -5087,7 +4973,7 @@
           <a:lstStyle/>
           <a:p>
             <a:r>
-              <a:rPr lang="fr-FR" dirty="0" smtClean="0">
+              <a:rPr lang="fr-FR" dirty="0">
                 <a:solidFill>
                   <a:schemeClr val="bg1"/>
                 </a:solidFill>
@@ -5095,12 +4981,6 @@
               </a:rPr>
               <a:t>Organisation du projet</a:t>
             </a:r>
-            <a:endParaRPr lang="fr-FR" dirty="0">
-              <a:solidFill>
-                <a:schemeClr val="bg1"/>
-              </a:solidFill>
-              <a:latin typeface="Alone On Earth" pitchFamily="50" charset="0"/>
-            </a:endParaRPr>
           </a:p>
         </p:txBody>
       </p:sp>
@@ -5197,13 +5077,6 @@
   <p:clrMapOvr>
     <a:masterClrMapping/>
   </p:clrMapOvr>
-  <p:timing>
-    <p:tnLst>
-      <p:par>
-        <p:cTn id="1" dur="indefinite" restart="never" nodeType="tmRoot"/>
-      </p:par>
-    </p:tnLst>
-  </p:timing>
 </p:sld>
 </file>
 
@@ -5255,7 +5128,7 @@
           <a:lstStyle/>
           <a:p>
             <a:r>
-              <a:rPr lang="fr-FR" dirty="0" smtClean="0">
+              <a:rPr lang="fr-FR" dirty="0">
                 <a:solidFill>
                   <a:schemeClr val="bg1"/>
                 </a:solidFill>
@@ -5263,12 +5136,6 @@
               </a:rPr>
               <a:t>Organisation du projet</a:t>
             </a:r>
-            <a:endParaRPr lang="fr-FR" dirty="0">
-              <a:solidFill>
-                <a:schemeClr val="bg1"/>
-              </a:solidFill>
-              <a:latin typeface="Alone On Earth" pitchFamily="50" charset="0"/>
-            </a:endParaRPr>
           </a:p>
         </p:txBody>
       </p:sp>
@@ -5365,13 +5232,6 @@
   <p:clrMapOvr>
     <a:masterClrMapping/>
   </p:clrMapOvr>
-  <p:timing>
-    <p:tnLst>
-      <p:par>
-        <p:cTn id="1" dur="indefinite" restart="never" nodeType="tmRoot"/>
-      </p:par>
-    </p:tnLst>
-  </p:timing>
 </p:sld>
 </file>
 
@@ -5423,7 +5283,7 @@
           <a:lstStyle/>
           <a:p>
             <a:r>
-              <a:rPr lang="fr-FR" dirty="0" smtClean="0">
+              <a:rPr lang="fr-FR" dirty="0">
                 <a:solidFill>
                   <a:schemeClr val="bg1"/>
                 </a:solidFill>
@@ -5431,12 +5291,6 @@
               </a:rPr>
               <a:t>Organisation du projet</a:t>
             </a:r>
-            <a:endParaRPr lang="fr-FR" dirty="0">
-              <a:solidFill>
-                <a:schemeClr val="bg1"/>
-              </a:solidFill>
-              <a:latin typeface="Alone On Earth" pitchFamily="50" charset="0"/>
-            </a:endParaRPr>
           </a:p>
         </p:txBody>
       </p:sp>
@@ -5533,13 +5387,6 @@
   <p:clrMapOvr>
     <a:masterClrMapping/>
   </p:clrMapOvr>
-  <p:timing>
-    <p:tnLst>
-      <p:par>
-        <p:cTn id="1" dur="indefinite" restart="never" nodeType="tmRoot"/>
-      </p:par>
-    </p:tnLst>
-  </p:timing>
 </p:sld>
 </file>
 
@@ -5591,7 +5438,7 @@
           <a:lstStyle/>
           <a:p>
             <a:r>
-              <a:rPr lang="fr-FR" dirty="0" smtClean="0">
+              <a:rPr lang="fr-FR" dirty="0">
                 <a:solidFill>
                   <a:schemeClr val="bg1"/>
                 </a:solidFill>
@@ -5599,6 +5446,91 @@
               </a:rPr>
               <a:t>Sommaire</a:t>
             </a:r>
+          </a:p>
+        </p:txBody>
+      </p:sp>
+      <p:sp>
+        <p:nvSpPr>
+          <p:cNvPr id="4" name="ZoneTexte 3"/>
+          <p:cNvSpPr txBox="1"/>
+          <p:nvPr/>
+        </p:nvSpPr>
+        <p:spPr>
+          <a:xfrm>
+            <a:off x="8369559" y="57727"/>
+            <a:ext cx="4168805" cy="369332"/>
+          </a:xfrm>
+          <a:prstGeom prst="rect">
+            <a:avLst/>
+          </a:prstGeom>
+          <a:noFill/>
+        </p:spPr>
+        <p:txBody>
+          <a:bodyPr wrap="square" rtlCol="0">
+            <a:spAutoFit/>
+          </a:bodyPr>
+          <a:lstStyle/>
+          <a:p>
+            <a:pPr algn="ctr"/>
+            <a:r>
+              <a:rPr lang="fr-FR" dirty="0">
+                <a:solidFill>
+                  <a:schemeClr val="bg1"/>
+                </a:solidFill>
+                <a:latin typeface="Alone On Earth" pitchFamily="50" charset="0"/>
+              </a:rPr>
+              <a:t>Etudiant 1 : Grégoire Colbert</a:t>
+            </a:r>
+          </a:p>
+        </p:txBody>
+      </p:sp>
+      <p:sp>
+        <p:nvSpPr>
+          <p:cNvPr id="3" name="ZoneTexte 2"/>
+          <p:cNvSpPr txBox="1"/>
+          <p:nvPr/>
+        </p:nvSpPr>
+        <p:spPr>
+          <a:xfrm>
+            <a:off x="0" y="2389109"/>
+            <a:ext cx="3452327" cy="3170099"/>
+          </a:xfrm>
+          <a:prstGeom prst="rect">
+            <a:avLst/>
+          </a:prstGeom>
+          <a:noFill/>
+        </p:spPr>
+        <p:txBody>
+          <a:bodyPr wrap="square" rtlCol="0">
+            <a:spAutoFit/>
+          </a:bodyPr>
+          <a:lstStyle/>
+          <a:p>
+            <a:pPr algn="ctr"/>
+            <a:r>
+              <a:rPr lang="fr-FR" sz="2400" dirty="0">
+                <a:solidFill>
+                  <a:schemeClr val="bg1"/>
+                </a:solidFill>
+                <a:latin typeface="Alone On Earth" pitchFamily="50" charset="0"/>
+              </a:rPr>
+              <a:t>Première partie</a:t>
+            </a:r>
+          </a:p>
+          <a:p>
+            <a:pPr algn="ctr"/>
+            <a:r>
+              <a:rPr lang="fr-FR" dirty="0">
+                <a:solidFill>
+                  <a:schemeClr val="bg1"/>
+                </a:solidFill>
+                <a:latin typeface="Alone On Earth" pitchFamily="50" charset="0"/>
+              </a:rPr>
+              <a:t>-----------------------</a:t>
+            </a:r>
+          </a:p>
+          <a:p>
+            <a:pPr algn="ctr"/>
             <a:endParaRPr lang="fr-FR" dirty="0">
               <a:solidFill>
                 <a:schemeClr val="bg1"/>
@@ -5606,29 +5538,6 @@
               <a:latin typeface="Alone On Earth" pitchFamily="50" charset="0"/>
             </a:endParaRPr>
           </a:p>
-        </p:txBody>
-      </p:sp>
-      <p:sp>
-        <p:nvSpPr>
-          <p:cNvPr id="4" name="ZoneTexte 3"/>
-          <p:cNvSpPr txBox="1"/>
-          <p:nvPr/>
-        </p:nvSpPr>
-        <p:spPr>
-          <a:xfrm>
-            <a:off x="8369559" y="57727"/>
-            <a:ext cx="4168805" cy="369332"/>
-          </a:xfrm>
-          <a:prstGeom prst="rect">
-            <a:avLst/>
-          </a:prstGeom>
-          <a:noFill/>
-        </p:spPr>
-        <p:txBody>
-          <a:bodyPr wrap="square" rtlCol="0">
-            <a:spAutoFit/>
-          </a:bodyPr>
-          <a:lstStyle/>
           <a:p>
             <a:pPr algn="ctr"/>
             <a:r>
@@ -5638,59 +5547,12 @@
                 </a:solidFill>
                 <a:latin typeface="Alone On Earth" pitchFamily="50" charset="0"/>
               </a:rPr>
-              <a:t>Etudiant 1 : Grégoire Colbert</a:t>
-            </a:r>
-          </a:p>
-        </p:txBody>
-      </p:sp>
-      <p:sp>
-        <p:nvSpPr>
-          <p:cNvPr id="3" name="ZoneTexte 2"/>
-          <p:cNvSpPr txBox="1"/>
-          <p:nvPr/>
-        </p:nvSpPr>
-        <p:spPr>
-          <a:xfrm>
-            <a:off x="0" y="2389109"/>
-            <a:ext cx="3452327" cy="3170099"/>
-          </a:xfrm>
-          <a:prstGeom prst="rect">
-            <a:avLst/>
-          </a:prstGeom>
-          <a:noFill/>
-        </p:spPr>
-        <p:txBody>
-          <a:bodyPr wrap="square" rtlCol="0">
-            <a:spAutoFit/>
-          </a:bodyPr>
-          <a:lstStyle/>
+              <a:t>Présentation du projet</a:t>
+            </a:r>
+          </a:p>
           <a:p>
             <a:pPr algn="ctr"/>
-            <a:r>
-              <a:rPr lang="fr-FR" sz="2400" dirty="0" smtClean="0">
-                <a:solidFill>
-                  <a:schemeClr val="bg1"/>
-                </a:solidFill>
-                <a:latin typeface="Alone On Earth" pitchFamily="50" charset="0"/>
-              </a:rPr>
-              <a:t>Première partie</a:t>
-            </a:r>
-          </a:p>
-          <a:p>
-            <a:pPr algn="ctr"/>
-            <a:r>
-              <a:rPr lang="fr-FR" dirty="0" smtClean="0">
-                <a:solidFill>
-                  <a:schemeClr val="bg1"/>
-                </a:solidFill>
-                <a:latin typeface="Alone On Earth" pitchFamily="50" charset="0"/>
-              </a:rPr>
-              <a:t>-----------------------</a:t>
-            </a:r>
-          </a:p>
-          <a:p>
-            <a:pPr algn="ctr"/>
-            <a:endParaRPr lang="fr-FR" dirty="0" smtClean="0">
+            <a:endParaRPr lang="fr-FR" dirty="0">
               <a:solidFill>
                 <a:schemeClr val="bg1"/>
               </a:solidFill>
@@ -5700,18 +5562,18 @@
           <a:p>
             <a:pPr algn="ctr"/>
             <a:r>
-              <a:rPr lang="fr-FR" dirty="0" smtClean="0">
+              <a:rPr lang="fr-FR" dirty="0">
                 <a:solidFill>
                   <a:schemeClr val="bg1"/>
                 </a:solidFill>
                 <a:latin typeface="Alone On Earth" pitchFamily="50" charset="0"/>
               </a:rPr>
-              <a:t>Présentation du projet</a:t>
+              <a:t>Organisation/Travail d’équipe</a:t>
             </a:r>
           </a:p>
           <a:p>
             <a:pPr algn="ctr"/>
-            <a:endParaRPr lang="fr-FR" dirty="0" smtClean="0">
+            <a:endParaRPr lang="fr-FR" dirty="0">
               <a:solidFill>
                 <a:schemeClr val="bg1"/>
               </a:solidFill>
@@ -5721,28 +5583,7 @@
           <a:p>
             <a:pPr algn="ctr"/>
             <a:r>
-              <a:rPr lang="fr-FR" dirty="0" smtClean="0">
-                <a:solidFill>
-                  <a:schemeClr val="bg1"/>
-                </a:solidFill>
-                <a:latin typeface="Alone On Earth" pitchFamily="50" charset="0"/>
-              </a:rPr>
-              <a:t>Organisation/Travail d’équipe</a:t>
-            </a:r>
-          </a:p>
-          <a:p>
-            <a:pPr algn="ctr"/>
-            <a:endParaRPr lang="fr-FR" dirty="0" smtClean="0">
-              <a:solidFill>
-                <a:schemeClr val="bg1"/>
-              </a:solidFill>
-              <a:latin typeface="Alone On Earth" pitchFamily="50" charset="0"/>
-            </a:endParaRPr>
-          </a:p>
-          <a:p>
-            <a:pPr algn="ctr"/>
-            <a:r>
-              <a:rPr lang="fr-FR" dirty="0" smtClean="0">
+              <a:rPr lang="fr-FR" dirty="0">
                 <a:solidFill>
                   <a:schemeClr val="bg1"/>
                 </a:solidFill>
@@ -5762,7 +5603,7 @@
           </a:p>
           <a:p>
             <a:pPr algn="ctr"/>
-            <a:endParaRPr lang="fr-FR" sz="1600" dirty="0" smtClean="0">
+            <a:endParaRPr lang="fr-FR" sz="1600" dirty="0">
               <a:solidFill>
                 <a:schemeClr val="bg1"/>
               </a:solidFill>
@@ -5849,28 +5690,13 @@
                 </a:solidFill>
                 <a:latin typeface="Alone On Earth" pitchFamily="50" charset="0"/>
               </a:rPr>
-              <a:t>Deuxième </a:t>
-            </a:r>
-            <a:r>
-              <a:rPr lang="fr-FR" sz="2400" dirty="0" smtClean="0">
-                <a:solidFill>
-                  <a:schemeClr val="bg1"/>
-                </a:solidFill>
-                <a:latin typeface="Alone On Earth" pitchFamily="50" charset="0"/>
-              </a:rPr>
-              <a:t>partie</a:t>
-            </a:r>
-            <a:endParaRPr lang="fr-FR" sz="2400" dirty="0">
-              <a:solidFill>
-                <a:schemeClr val="bg1"/>
-              </a:solidFill>
-              <a:latin typeface="Alone On Earth" pitchFamily="50" charset="0"/>
-            </a:endParaRPr>
+              <a:t>Deuxième partie</a:t>
+            </a:r>
           </a:p>
           <a:p>
             <a:pPr algn="ctr"/>
             <a:r>
-              <a:rPr lang="fr-FR" dirty="0" smtClean="0">
+              <a:rPr lang="fr-FR" dirty="0">
                 <a:solidFill>
                   <a:schemeClr val="bg1"/>
                 </a:solidFill>
@@ -5897,16 +5723,7 @@
                 </a:solidFill>
                 <a:latin typeface="Alone On Earth" pitchFamily="50" charset="0"/>
               </a:rPr>
-              <a:t>Module de test numéro </a:t>
-            </a:r>
-            <a:r>
-              <a:rPr lang="fr-FR" dirty="0" smtClean="0">
-                <a:solidFill>
-                  <a:schemeClr val="bg1"/>
-                </a:solidFill>
-                <a:latin typeface="Alone On Earth" pitchFamily="50" charset="0"/>
-              </a:rPr>
-              <a:t>1</a:t>
+              <a:t>Module de test numéro 1</a:t>
             </a:r>
           </a:p>
           <a:p>
@@ -5978,7 +5795,7 @@
           <a:p>
             <a:pPr algn="ctr"/>
             <a:r>
-              <a:rPr lang="fr-FR" dirty="0" smtClean="0">
+              <a:rPr lang="fr-FR" dirty="0">
                 <a:solidFill>
                   <a:schemeClr val="bg1"/>
                 </a:solidFill>
@@ -5999,7 +5816,7 @@
           <a:p>
             <a:pPr algn="ctr"/>
             <a:r>
-              <a:rPr lang="fr-FR" dirty="0" smtClean="0">
+              <a:rPr lang="fr-FR" dirty="0">
                 <a:solidFill>
                   <a:schemeClr val="bg1"/>
                 </a:solidFill>
@@ -6045,13 +5862,6 @@
   <p:clrMapOvr>
     <a:masterClrMapping/>
   </p:clrMapOvr>
-  <p:timing>
-    <p:tnLst>
-      <p:par>
-        <p:cTn id="1" dur="indefinite" restart="never" nodeType="tmRoot"/>
-      </p:par>
-    </p:tnLst>
-  </p:timing>
 </p:sld>
 </file>
 
@@ -6103,7 +5913,7 @@
           <a:lstStyle/>
           <a:p>
             <a:r>
-              <a:rPr lang="fr-FR" dirty="0" smtClean="0">
+              <a:rPr lang="fr-FR" dirty="0">
                 <a:solidFill>
                   <a:schemeClr val="bg1"/>
                 </a:solidFill>
@@ -6111,12 +5921,6 @@
               </a:rPr>
               <a:t>Organisation du projet</a:t>
             </a:r>
-            <a:endParaRPr lang="fr-FR" dirty="0">
-              <a:solidFill>
-                <a:schemeClr val="bg1"/>
-              </a:solidFill>
-              <a:latin typeface="Alone On Earth" pitchFamily="50" charset="0"/>
-            </a:endParaRPr>
           </a:p>
         </p:txBody>
       </p:sp>
@@ -6213,13 +6017,6 @@
   <p:clrMapOvr>
     <a:masterClrMapping/>
   </p:clrMapOvr>
-  <p:timing>
-    <p:tnLst>
-      <p:par>
-        <p:cTn id="1" dur="indefinite" restart="never" nodeType="tmRoot"/>
-      </p:par>
-    </p:tnLst>
-  </p:timing>
 </p:sld>
 </file>
 
@@ -6271,7 +6068,7 @@
           <a:lstStyle/>
           <a:p>
             <a:r>
-              <a:rPr lang="fr-FR" dirty="0" smtClean="0">
+              <a:rPr lang="fr-FR" dirty="0">
                 <a:solidFill>
                   <a:schemeClr val="bg1"/>
                 </a:solidFill>
@@ -6279,12 +6076,6 @@
               </a:rPr>
               <a:t>Présentation du projet</a:t>
             </a:r>
-            <a:endParaRPr lang="fr-FR" dirty="0">
-              <a:solidFill>
-                <a:schemeClr val="bg1"/>
-              </a:solidFill>
-              <a:latin typeface="Alone On Earth" pitchFamily="50" charset="0"/>
-            </a:endParaRPr>
           </a:p>
         </p:txBody>
       </p:sp>
@@ -6598,7 +6389,7 @@
           <a:p>
             <a:pPr algn="ctr"/>
             <a:r>
-              <a:rPr lang="fr-FR" dirty="0" smtClean="0">
+              <a:rPr lang="fr-FR" dirty="0">
                 <a:solidFill>
                   <a:schemeClr val="bg1"/>
                 </a:solidFill>
@@ -6606,12 +6397,6 @@
               </a:rPr>
               <a:t>Passage d’un format papier à un format numérique </a:t>
             </a:r>
-            <a:endParaRPr lang="fr-FR" dirty="0">
-              <a:solidFill>
-                <a:schemeClr val="bg1"/>
-              </a:solidFill>
-              <a:latin typeface="Alone On Earth" pitchFamily="50" charset="0"/>
-            </a:endParaRPr>
           </a:p>
         </p:txBody>
       </p:sp>
@@ -6673,13 +6458,6 @@
   <p:clrMapOvr>
     <a:masterClrMapping/>
   </p:clrMapOvr>
-  <p:timing>
-    <p:tnLst>
-      <p:par>
-        <p:cTn id="1" dur="indefinite" restart="never" nodeType="tmRoot"/>
-      </p:par>
-    </p:tnLst>
-  </p:timing>
 </p:sld>
 </file>
 
@@ -6732,7 +6510,7 @@
           <a:lstStyle/>
           <a:p>
             <a:r>
-              <a:rPr lang="fr-FR" dirty="0" smtClean="0">
+              <a:rPr lang="fr-FR" dirty="0">
                 <a:solidFill>
                   <a:schemeClr val="bg1"/>
                 </a:solidFill>
@@ -6740,12 +6518,6 @@
               </a:rPr>
               <a:t>Présentation du projet</a:t>
             </a:r>
-            <a:endParaRPr lang="fr-FR" dirty="0">
-              <a:solidFill>
-                <a:schemeClr val="bg1"/>
-              </a:solidFill>
-              <a:latin typeface="Alone On Earth" pitchFamily="50" charset="0"/>
-            </a:endParaRPr>
           </a:p>
         </p:txBody>
       </p:sp>
@@ -6808,7 +6580,7 @@
           <a:p>
             <a:pPr algn="ctr"/>
             <a:r>
-              <a:rPr lang="fr-FR" sz="2000" dirty="0" smtClean="0">
+              <a:rPr lang="fr-FR" sz="2000" dirty="0">
                 <a:solidFill>
                   <a:schemeClr val="bg1"/>
                 </a:solidFill>
@@ -6816,12 +6588,6 @@
               </a:rPr>
               <a:t>Fonction numéro 1</a:t>
             </a:r>
-            <a:endParaRPr lang="fr-FR" sz="2000" dirty="0">
-              <a:solidFill>
-                <a:schemeClr val="bg1"/>
-              </a:solidFill>
-              <a:latin typeface="Alone On Earth" pitchFamily="50" charset="0"/>
-            </a:endParaRPr>
           </a:p>
         </p:txBody>
       </p:sp>
@@ -6849,7 +6615,7 @@
           <a:p>
             <a:pPr algn="ctr"/>
             <a:r>
-              <a:rPr lang="fr-FR" sz="2000" dirty="0" smtClean="0">
+              <a:rPr lang="fr-FR" sz="2000" dirty="0">
                 <a:solidFill>
                   <a:schemeClr val="bg1"/>
                 </a:solidFill>
@@ -7002,34 +6768,16 @@
           <a:p>
             <a:pPr algn="ctr"/>
             <a:r>
-              <a:rPr lang="fr-FR" sz="2400" dirty="0" smtClean="0">
+              <a:rPr lang="fr-FR" sz="2400" dirty="0">
                 <a:solidFill>
                   <a:schemeClr val="bg1"/>
                 </a:solidFill>
                 <a:latin typeface="Alone On Earth" pitchFamily="50" charset="0"/>
               </a:rPr>
-              <a:t>Scan </a:t>
-            </a:r>
-            <a:r>
-              <a:rPr lang="fr-FR" sz="2400" dirty="0">
-                <a:solidFill>
-                  <a:schemeClr val="bg1"/>
-                </a:solidFill>
-                <a:latin typeface="Alone On Earth" pitchFamily="50" charset="0"/>
-              </a:rPr>
-              <a:t>d</a:t>
-            </a:r>
-            <a:r>
-              <a:rPr lang="fr-FR" sz="2400" dirty="0" smtClean="0">
-                <a:solidFill>
-                  <a:schemeClr val="bg1"/>
-                </a:solidFill>
-                <a:latin typeface="Alone On Earth" pitchFamily="50" charset="0"/>
-              </a:rPr>
-              <a:t>es puces </a:t>
-            </a:r>
-            <a:r>
-              <a:rPr lang="fr-FR" sz="2400" dirty="0" err="1" smtClean="0">
+              <a:t>Scan des puces </a:t>
+            </a:r>
+            <a:r>
+              <a:rPr lang="fr-FR" sz="2400" dirty="0" err="1">
                 <a:solidFill>
                   <a:schemeClr val="bg1"/>
                 </a:solidFill>
@@ -7038,7 +6786,7 @@
               <a:t>rfid</a:t>
             </a:r>
             <a:r>
-              <a:rPr lang="fr-FR" sz="2400" dirty="0" smtClean="0">
+              <a:rPr lang="fr-FR" sz="2400" dirty="0">
                 <a:solidFill>
                   <a:schemeClr val="bg1"/>
                 </a:solidFill>
@@ -7046,12 +6794,6 @@
               </a:rPr>
               <a:t> cachées dans les dossards</a:t>
             </a:r>
-            <a:endParaRPr lang="fr-FR" sz="2400" dirty="0">
-              <a:solidFill>
-                <a:schemeClr val="bg1"/>
-              </a:solidFill>
-              <a:latin typeface="Alone On Earth" pitchFamily="50" charset="0"/>
-            </a:endParaRPr>
           </a:p>
         </p:txBody>
       </p:sp>
@@ -7079,7 +6821,7 @@
           <a:p>
             <a:pPr algn="ctr"/>
             <a:r>
-              <a:rPr lang="fr-FR" sz="2400" dirty="0" smtClean="0">
+              <a:rPr lang="fr-FR" sz="2400" dirty="0">
                 <a:solidFill>
                   <a:schemeClr val="bg1"/>
                 </a:solidFill>
@@ -7087,12 +6829,6 @@
               </a:rPr>
               <a:t>Affichage du classement en temps réel</a:t>
             </a:r>
-            <a:endParaRPr lang="fr-FR" sz="2400" dirty="0">
-              <a:solidFill>
-                <a:schemeClr val="bg1"/>
-              </a:solidFill>
-              <a:latin typeface="Alone On Earth" pitchFamily="50" charset="0"/>
-            </a:endParaRPr>
           </a:p>
         </p:txBody>
       </p:sp>
@@ -7273,13 +7009,6 @@
   <p:clrMapOvr>
     <a:masterClrMapping/>
   </p:clrMapOvr>
-  <p:timing>
-    <p:tnLst>
-      <p:par>
-        <p:cTn id="1" dur="indefinite" restart="never" nodeType="tmRoot"/>
-      </p:par>
-    </p:tnLst>
-  </p:timing>
 </p:sld>
 </file>
 
@@ -7331,7 +7060,7 @@
           <a:lstStyle/>
           <a:p>
             <a:r>
-              <a:rPr lang="fr-FR" dirty="0" smtClean="0">
+              <a:rPr lang="fr-FR" dirty="0">
                 <a:solidFill>
                   <a:schemeClr val="bg1"/>
                 </a:solidFill>
@@ -7339,12 +7068,6 @@
               </a:rPr>
               <a:t>Présentation du projet</a:t>
             </a:r>
-            <a:endParaRPr lang="fr-FR" dirty="0">
-              <a:solidFill>
-                <a:schemeClr val="bg1"/>
-              </a:solidFill>
-              <a:latin typeface="Alone On Earth" pitchFamily="50" charset="0"/>
-            </a:endParaRPr>
           </a:p>
         </p:txBody>
       </p:sp>
@@ -7407,7 +7130,7 @@
           <a:p>
             <a:pPr algn="ctr"/>
             <a:r>
-              <a:rPr lang="fr-FR" sz="2000" dirty="0" smtClean="0">
+              <a:rPr lang="fr-FR" sz="2000" dirty="0">
                 <a:solidFill>
                   <a:schemeClr val="bg1"/>
                 </a:solidFill>
@@ -7415,12 +7138,6 @@
               </a:rPr>
               <a:t>Avantages du passage au format numérique</a:t>
             </a:r>
-            <a:endParaRPr lang="fr-FR" sz="2000" dirty="0">
-              <a:solidFill>
-                <a:schemeClr val="bg1"/>
-              </a:solidFill>
-              <a:latin typeface="Alone On Earth" pitchFamily="50" charset="0"/>
-            </a:endParaRPr>
           </a:p>
         </p:txBody>
       </p:sp>
@@ -7683,7 +7400,7 @@
           <a:p>
             <a:pPr algn="ctr"/>
             <a:r>
-              <a:rPr lang="fr-FR" dirty="0" smtClean="0">
+              <a:rPr lang="fr-FR" dirty="0">
                 <a:solidFill>
                   <a:schemeClr val="bg1"/>
                 </a:solidFill>
@@ -7718,7 +7435,7 @@
           <a:p>
             <a:pPr algn="ctr"/>
             <a:r>
-              <a:rPr lang="fr-FR" dirty="0" smtClean="0">
+              <a:rPr lang="fr-FR" dirty="0">
                 <a:solidFill>
                   <a:schemeClr val="bg1"/>
                 </a:solidFill>
@@ -7753,7 +7470,7 @@
           <a:p>
             <a:pPr algn="ctr"/>
             <a:r>
-              <a:rPr lang="fr-FR" dirty="0" smtClean="0">
+              <a:rPr lang="fr-FR" dirty="0">
                 <a:solidFill>
                   <a:schemeClr val="bg1"/>
                 </a:solidFill>
@@ -7874,13 +7591,6 @@
   <p:clrMapOvr>
     <a:masterClrMapping/>
   </p:clrMapOvr>
-  <p:timing>
-    <p:tnLst>
-      <p:par>
-        <p:cTn id="1" dur="indefinite" restart="never" nodeType="tmRoot"/>
-      </p:par>
-    </p:tnLst>
-  </p:timing>
 </p:sld>
 </file>
 
@@ -7932,7 +7642,7 @@
           <a:lstStyle/>
           <a:p>
             <a:r>
-              <a:rPr lang="fr-FR" dirty="0" smtClean="0">
+              <a:rPr lang="fr-FR" dirty="0">
                 <a:solidFill>
                   <a:schemeClr val="bg1"/>
                 </a:solidFill>
@@ -7940,12 +7650,6 @@
               </a:rPr>
               <a:t>Organisation du projet</a:t>
             </a:r>
-            <a:endParaRPr lang="fr-FR" dirty="0">
-              <a:solidFill>
-                <a:schemeClr val="bg1"/>
-              </a:solidFill>
-              <a:latin typeface="Alone On Earth" pitchFamily="50" charset="0"/>
-            </a:endParaRPr>
           </a:p>
         </p:txBody>
       </p:sp>
@@ -8055,7 +7759,7 @@
           <a:lstStyle/>
           <a:p>
             <a:r>
-              <a:rPr lang="fr-FR" sz="2000" dirty="0" smtClean="0">
+              <a:rPr lang="fr-FR" sz="2000" dirty="0">
                 <a:solidFill>
                   <a:schemeClr val="bg1"/>
                 </a:solidFill>
@@ -8112,18 +7816,13 @@
           <a:lstStyle/>
           <a:p>
             <a:r>
-              <a:rPr lang="fr-FR" sz="2000" dirty="0" smtClean="0">
+              <a:rPr lang="fr-FR" sz="2000" dirty="0">
                 <a:solidFill>
                   <a:schemeClr val="bg1"/>
                 </a:solidFill>
               </a:rPr>
               <a:t>Répartition des tâches</a:t>
             </a:r>
-            <a:endParaRPr lang="fr-FR" sz="2000" dirty="0">
-              <a:solidFill>
-                <a:schemeClr val="bg1"/>
-              </a:solidFill>
-            </a:endParaRPr>
           </a:p>
         </p:txBody>
       </p:sp>
@@ -8150,18 +7849,13 @@
           <a:lstStyle/>
           <a:p>
             <a:r>
-              <a:rPr lang="fr-FR" sz="3600" dirty="0" smtClean="0">
+              <a:rPr lang="fr-FR" sz="3600" dirty="0">
                 <a:solidFill>
                   <a:schemeClr val="bg1"/>
                 </a:solidFill>
               </a:rPr>
               <a:t>CRA</a:t>
             </a:r>
-            <a:endParaRPr lang="fr-FR" sz="3600" dirty="0">
-              <a:solidFill>
-                <a:schemeClr val="bg1"/>
-              </a:solidFill>
-            </a:endParaRPr>
           </a:p>
         </p:txBody>
       </p:sp>
@@ -8175,13 +7869,6 @@
   <p:clrMapOvr>
     <a:masterClrMapping/>
   </p:clrMapOvr>
-  <p:timing>
-    <p:tnLst>
-      <p:par>
-        <p:cTn id="1" dur="indefinite" restart="never" nodeType="tmRoot"/>
-      </p:par>
-    </p:tnLst>
-  </p:timing>
 </p:sld>
 </file>
 
@@ -8233,7 +7920,7 @@
           <a:lstStyle/>
           <a:p>
             <a:r>
-              <a:rPr lang="fr-FR" dirty="0" smtClean="0">
+              <a:rPr lang="fr-FR" dirty="0">
                 <a:solidFill>
                   <a:schemeClr val="bg1"/>
                 </a:solidFill>
@@ -8241,12 +7928,6 @@
               </a:rPr>
               <a:t>Analyse fonctionnelle</a:t>
             </a:r>
-            <a:endParaRPr lang="fr-FR" dirty="0">
-              <a:solidFill>
-                <a:schemeClr val="bg1"/>
-              </a:solidFill>
-              <a:latin typeface="Alone On Earth" pitchFamily="50" charset="0"/>
-            </a:endParaRPr>
           </a:p>
         </p:txBody>
       </p:sp>
@@ -8386,18 +8067,13 @@
           <a:lstStyle/>
           <a:p>
             <a:r>
-              <a:rPr lang="fr-FR" sz="2800" dirty="0" smtClean="0">
+              <a:rPr lang="fr-FR" sz="2800" dirty="0">
                 <a:solidFill>
                   <a:schemeClr val="bg1"/>
                 </a:solidFill>
               </a:rPr>
               <a:t>Diagramme de cas d’utilisation générale simplifié</a:t>
             </a:r>
-            <a:endParaRPr lang="fr-FR" sz="2800" dirty="0">
-              <a:solidFill>
-                <a:schemeClr val="bg1"/>
-              </a:solidFill>
-            </a:endParaRPr>
           </a:p>
         </p:txBody>
       </p:sp>
@@ -8411,13 +8087,6 @@
   <p:clrMapOvr>
     <a:masterClrMapping/>
   </p:clrMapOvr>
-  <p:timing>
-    <p:tnLst>
-      <p:par>
-        <p:cTn id="1" dur="indefinite" restart="never" nodeType="tmRoot"/>
-      </p:par>
-    </p:tnLst>
-  </p:timing>
 </p:sld>
 </file>
 
@@ -8477,12 +8146,6 @@
               </a:rPr>
               <a:t>Analyse fonctionnelle</a:t>
             </a:r>
-            <a:endParaRPr lang="fr-FR" dirty="0">
-              <a:solidFill>
-                <a:schemeClr val="bg1"/>
-              </a:solidFill>
-              <a:latin typeface="Alone On Earth" pitchFamily="50" charset="0"/>
-            </a:endParaRPr>
           </a:p>
         </p:txBody>
       </p:sp>
@@ -8592,18 +8255,13 @@
           <a:lstStyle/>
           <a:p>
             <a:r>
-              <a:rPr lang="fr-FR" sz="2800" dirty="0" smtClean="0">
+              <a:rPr lang="fr-FR" sz="2800" dirty="0">
                 <a:solidFill>
                   <a:schemeClr val="bg1"/>
                 </a:solidFill>
               </a:rPr>
               <a:t>Diagramme de cas d’utilisation personnel détaillé</a:t>
             </a:r>
-            <a:endParaRPr lang="fr-FR" sz="2800" dirty="0">
-              <a:solidFill>
-                <a:schemeClr val="bg1"/>
-              </a:solidFill>
-            </a:endParaRPr>
           </a:p>
         </p:txBody>
       </p:sp>
@@ -8647,13 +8305,6 @@
   <p:clrMapOvr>
     <a:masterClrMapping/>
   </p:clrMapOvr>
-  <p:timing>
-    <p:tnLst>
-      <p:par>
-        <p:cTn id="1" dur="indefinite" restart="never" nodeType="tmRoot"/>
-      </p:par>
-    </p:tnLst>
-  </p:timing>
 </p:sld>
 </file>
 
@@ -8705,7 +8356,7 @@
           <a:lstStyle/>
           <a:p>
             <a:r>
-              <a:rPr lang="fr-FR" dirty="0" smtClean="0">
+              <a:rPr lang="fr-FR" dirty="0">
                 <a:solidFill>
                   <a:schemeClr val="bg1"/>
                 </a:solidFill>
@@ -8713,12 +8364,6 @@
               </a:rPr>
               <a:t>MCD</a:t>
             </a:r>
-            <a:endParaRPr lang="fr-FR" dirty="0">
-              <a:solidFill>
-                <a:schemeClr val="bg1"/>
-              </a:solidFill>
-              <a:latin typeface="Alone On Earth" pitchFamily="50" charset="0"/>
-            </a:endParaRPr>
           </a:p>
         </p:txBody>
       </p:sp>
@@ -8807,9 +8452,15 @@
       </p:pic>
       <p:pic>
         <p:nvPicPr>
-          <p:cNvPr id="3" name="Image 2"/>
+          <p:cNvPr id="1026" name="Picture 2">
+            <a:extLst>
+              <a:ext uri="{FF2B5EF4-FFF2-40B4-BE49-F238E27FC236}">
+                <a16:creationId xmlns:a16="http://schemas.microsoft.com/office/drawing/2014/main" id="{05605849-1819-4C2A-A299-789A5E45CC7F}"/>
+              </a:ext>
+            </a:extLst>
+          </p:cNvPr>
           <p:cNvPicPr>
-            <a:picLocks noChangeAspect="1"/>
+            <a:picLocks noChangeAspect="1" noChangeArrowheads="1"/>
           </p:cNvPicPr>
           <p:nvPr/>
         </p:nvPicPr>
@@ -8821,18 +8472,29 @@
               </a:ext>
             </a:extLst>
           </a:blip>
+          <a:srcRect/>
           <a:stretch>
             <a:fillRect/>
           </a:stretch>
         </p:blipFill>
-        <p:spPr>
-          <a:xfrm>
-            <a:off x="2141465" y="1711181"/>
-            <a:ext cx="7862888" cy="4608494"/>
-          </a:xfrm>
-          <a:prstGeom prst="rect">
-            <a:avLst/>
-          </a:prstGeom>
+        <p:spPr bwMode="auto">
+          <a:xfrm>
+            <a:off x="2010883" y="1353272"/>
+            <a:ext cx="8229600" cy="5105400"/>
+          </a:xfrm>
+          <a:prstGeom prst="rect">
+            <a:avLst/>
+          </a:prstGeom>
+          <a:noFill/>
+          <a:extLst>
+            <a:ext uri="{909E8E84-426E-40DD-AFC4-6F175D3DCCD1}">
+              <a14:hiddenFill xmlns:a14="http://schemas.microsoft.com/office/drawing/2010/main">
+                <a:solidFill>
+                  <a:srgbClr val="FFFFFF"/>
+                </a:solidFill>
+              </a14:hiddenFill>
+            </a:ext>
+          </a:extLst>
         </p:spPr>
       </p:pic>
     </p:spTree>
@@ -8845,13 +8507,6 @@
   <p:clrMapOvr>
     <a:masterClrMapping/>
   </p:clrMapOvr>
-  <p:timing>
-    <p:tnLst>
-      <p:par>
-        <p:cTn id="1" dur="indefinite" restart="never" nodeType="tmRoot"/>
-      </p:par>
-    </p:tnLst>
-  </p:timing>
 </p:sld>
 </file>
 

</xml_diff>